<commit_message>
Updated home page and styles
</commit_message>
<xml_diff>
--- a/slides/Module 2 - Variables, Operators, and Assignment.pptx
+++ b/slides/Module 2 - Variables, Operators, and Assignment.pptx
@@ -2,7 +2,7 @@
 <file path=ppt/presentation.xml><?xml version="1.0" encoding="utf-8"?>
 <p:presentation xmlns:a="http://schemas.openxmlformats.org/drawingml/2006/main" xmlns:r="http://schemas.openxmlformats.org/officeDocument/2006/relationships" xmlns:p="http://schemas.openxmlformats.org/presentationml/2006/main" saveSubsetFonts="1">
   <p:sldMasterIdLst>
-    <p:sldMasterId id="2147483660" r:id="rId1"/>
+    <p:sldMasterId id="2147483672" r:id="rId1"/>
   </p:sldMasterIdLst>
   <p:sldIdLst>
     <p:sldId id="256" r:id="rId2"/>
@@ -31,7 +31,7 @@
     <a:defPPr>
       <a:defRPr lang="en-US"/>
     </a:defPPr>
-    <a:lvl1pPr marL="0" algn="l" defTabSz="457200" rtl="0" eaLnBrk="1" latinLnBrk="0" hangingPunct="1">
+    <a:lvl1pPr marL="0" algn="l" defTabSz="914400" rtl="0" eaLnBrk="1" latinLnBrk="0" hangingPunct="1">
       <a:defRPr sz="1800" kern="1200">
         <a:solidFill>
           <a:schemeClr val="tx1"/>
@@ -41,7 +41,7 @@
         <a:cs typeface="+mn-cs"/>
       </a:defRPr>
     </a:lvl1pPr>
-    <a:lvl2pPr marL="457200" algn="l" defTabSz="457200" rtl="0" eaLnBrk="1" latinLnBrk="0" hangingPunct="1">
+    <a:lvl2pPr marL="457200" algn="l" defTabSz="914400" rtl="0" eaLnBrk="1" latinLnBrk="0" hangingPunct="1">
       <a:defRPr sz="1800" kern="1200">
         <a:solidFill>
           <a:schemeClr val="tx1"/>
@@ -51,7 +51,7 @@
         <a:cs typeface="+mn-cs"/>
       </a:defRPr>
     </a:lvl2pPr>
-    <a:lvl3pPr marL="914400" algn="l" defTabSz="457200" rtl="0" eaLnBrk="1" latinLnBrk="0" hangingPunct="1">
+    <a:lvl3pPr marL="914400" algn="l" defTabSz="914400" rtl="0" eaLnBrk="1" latinLnBrk="0" hangingPunct="1">
       <a:defRPr sz="1800" kern="1200">
         <a:solidFill>
           <a:schemeClr val="tx1"/>
@@ -61,7 +61,7 @@
         <a:cs typeface="+mn-cs"/>
       </a:defRPr>
     </a:lvl3pPr>
-    <a:lvl4pPr marL="1371600" algn="l" defTabSz="457200" rtl="0" eaLnBrk="1" latinLnBrk="0" hangingPunct="1">
+    <a:lvl4pPr marL="1371600" algn="l" defTabSz="914400" rtl="0" eaLnBrk="1" latinLnBrk="0" hangingPunct="1">
       <a:defRPr sz="1800" kern="1200">
         <a:solidFill>
           <a:schemeClr val="tx1"/>
@@ -71,7 +71,7 @@
         <a:cs typeface="+mn-cs"/>
       </a:defRPr>
     </a:lvl4pPr>
-    <a:lvl5pPr marL="1828800" algn="l" defTabSz="457200" rtl="0" eaLnBrk="1" latinLnBrk="0" hangingPunct="1">
+    <a:lvl5pPr marL="1828800" algn="l" defTabSz="914400" rtl="0" eaLnBrk="1" latinLnBrk="0" hangingPunct="1">
       <a:defRPr sz="1800" kern="1200">
         <a:solidFill>
           <a:schemeClr val="tx1"/>
@@ -81,7 +81,7 @@
         <a:cs typeface="+mn-cs"/>
       </a:defRPr>
     </a:lvl5pPr>
-    <a:lvl6pPr marL="2286000" algn="l" defTabSz="457200" rtl="0" eaLnBrk="1" latinLnBrk="0" hangingPunct="1">
+    <a:lvl6pPr marL="2286000" algn="l" defTabSz="914400" rtl="0" eaLnBrk="1" latinLnBrk="0" hangingPunct="1">
       <a:defRPr sz="1800" kern="1200">
         <a:solidFill>
           <a:schemeClr val="tx1"/>
@@ -91,7 +91,7 @@
         <a:cs typeface="+mn-cs"/>
       </a:defRPr>
     </a:lvl6pPr>
-    <a:lvl7pPr marL="2743200" algn="l" defTabSz="457200" rtl="0" eaLnBrk="1" latinLnBrk="0" hangingPunct="1">
+    <a:lvl7pPr marL="2743200" algn="l" defTabSz="914400" rtl="0" eaLnBrk="1" latinLnBrk="0" hangingPunct="1">
       <a:defRPr sz="1800" kern="1200">
         <a:solidFill>
           <a:schemeClr val="tx1"/>
@@ -101,7 +101,7 @@
         <a:cs typeface="+mn-cs"/>
       </a:defRPr>
     </a:lvl7pPr>
-    <a:lvl8pPr marL="3200400" algn="l" defTabSz="457200" rtl="0" eaLnBrk="1" latinLnBrk="0" hangingPunct="1">
+    <a:lvl8pPr marL="3200400" algn="l" defTabSz="914400" rtl="0" eaLnBrk="1" latinLnBrk="0" hangingPunct="1">
       <a:defRPr sz="1800" kern="1200">
         <a:solidFill>
           <a:schemeClr val="tx1"/>
@@ -111,7 +111,7 @@
         <a:cs typeface="+mn-cs"/>
       </a:defRPr>
     </a:lvl8pPr>
-    <a:lvl9pPr marL="3657600" algn="l" defTabSz="457200" rtl="0" eaLnBrk="1" latinLnBrk="0" hangingPunct="1">
+    <a:lvl9pPr marL="3657600" algn="l" defTabSz="914400" rtl="0" eaLnBrk="1" latinLnBrk="0" hangingPunct="1">
       <a:defRPr sz="1800" kern="1200">
         <a:solidFill>
           <a:schemeClr val="tx1"/>
@@ -131,7 +131,7 @@
 </file>
 
 <file path=ppt/slideLayouts/slideLayout1.xml><?xml version="1.0" encoding="utf-8"?>
-<p:sldLayout xmlns:a="http://schemas.openxmlformats.org/drawingml/2006/main" xmlns:r="http://schemas.openxmlformats.org/officeDocument/2006/relationships" xmlns:p="http://schemas.openxmlformats.org/presentationml/2006/main" showMasterSp="0" type="title" preserve="1">
+<p:sldLayout xmlns:a="http://schemas.openxmlformats.org/drawingml/2006/main" xmlns:r="http://schemas.openxmlformats.org/officeDocument/2006/relationships" xmlns:p="http://schemas.openxmlformats.org/presentationml/2006/main" type="title" preserve="1">
   <p:cSld name="Title Slide">
     <p:spTree>
       <p:nvGrpSpPr>
@@ -149,362 +149,101 @@
       </p:grpSpPr>
       <p:sp>
         <p:nvSpPr>
-          <p:cNvPr id="7" name="Rectangle 6"/>
-          <p:cNvSpPr/>
-          <p:nvPr/>
+          <p:cNvPr id="2" name="Title 1">
+            <a:extLst>
+              <a:ext uri="{FF2B5EF4-FFF2-40B4-BE49-F238E27FC236}">
+                <a16:creationId xmlns:a16="http://schemas.microsoft.com/office/drawing/2014/main" id="{E2064621-DA48-4997-BEBD-1E65678E8FC4}"/>
+              </a:ext>
+            </a:extLst>
+          </p:cNvPr>
+          <p:cNvSpPr>
+            <a:spLocks noGrp="1"/>
+          </p:cNvSpPr>
+          <p:nvPr>
+            <p:ph type="ctrTitle"/>
+          </p:nvPr>
         </p:nvSpPr>
         <p:spPr>
           <a:xfrm>
-            <a:off x="920834" y="1346946"/>
-            <a:ext cx="10222992" cy="80683"/>
+            <a:off x="1524000" y="1122363"/>
+            <a:ext cx="9144000" cy="2387600"/>
           </a:xfrm>
-          <a:prstGeom prst="rect">
-            <a:avLst/>
-          </a:prstGeom>
-          <a:blipFill dpi="0" rotWithShape="1">
-            <a:blip r:embed="rId2">
-              <a:alphaModFix amt="85000"/>
-              <a:lum bright="70000" contrast="-70000"/>
-              <a:extLst>
-                <a:ext uri="{BEBA8EAE-BF5A-486C-A8C5-ECC9F3942E4B}">
-                  <a14:imgProps xmlns:a14="http://schemas.microsoft.com/office/drawing/2010/main">
-                    <a14:imgLayer r:embed="rId3">
-                      <a14:imgEffect>
-                        <a14:sharpenSoften amount="61000"/>
-                      </a14:imgEffect>
-                    </a14:imgLayer>
-                  </a14:imgProps>
-                </a:ext>
-                <a:ext uri="{28A0092B-C50C-407E-A947-70E740481C1C}">
-                  <a14:useLocalDpi xmlns:a14="http://schemas.microsoft.com/office/drawing/2010/main" val="0"/>
-                </a:ext>
-              </a:extLst>
-            </a:blip>
-            <a:srcRect/>
-            <a:tile tx="0" ty="-762000" sx="92000" sy="89000" flip="xy" algn="ctr"/>
-          </a:blipFill>
-          <a:ln>
-            <a:noFill/>
-          </a:ln>
         </p:spPr>
-        <p:style>
-          <a:lnRef idx="2">
-            <a:schemeClr val="accent1">
-              <a:shade val="50000"/>
-            </a:schemeClr>
-          </a:lnRef>
-          <a:fillRef idx="1">
-            <a:schemeClr val="accent1"/>
-          </a:fillRef>
-          <a:effectRef idx="0">
-            <a:schemeClr val="accent1"/>
-          </a:effectRef>
-          <a:fontRef idx="minor">
-            <a:schemeClr val="lt1"/>
-          </a:fontRef>
-        </p:style>
-      </p:sp>
-      <p:sp>
-        <p:nvSpPr>
-          <p:cNvPr id="8" name="Rectangle 7"/>
-          <p:cNvSpPr/>
-          <p:nvPr/>
+        <p:txBody>
+          <a:bodyPr anchor="b"/>
+          <a:lstStyle>
+            <a:lvl1pPr algn="ctr">
+              <a:defRPr sz="6000"/>
+            </a:lvl1pPr>
+          </a:lstStyle>
+          <a:p>
+            <a:r>
+              <a:rPr lang="en-US"/>
+              <a:t>Click to edit Master title style</a:t>
+            </a:r>
+          </a:p>
+        </p:txBody>
+      </p:sp>
+      <p:sp>
+        <p:nvSpPr>
+          <p:cNvPr id="3" name="Subtitle 2">
+            <a:extLst>
+              <a:ext uri="{FF2B5EF4-FFF2-40B4-BE49-F238E27FC236}">
+                <a16:creationId xmlns:a16="http://schemas.microsoft.com/office/drawing/2014/main" id="{2AE75438-CCB8-4A86-9B4B-7963B663E27C}"/>
+              </a:ext>
+            </a:extLst>
+          </p:cNvPr>
+          <p:cNvSpPr>
+            <a:spLocks noGrp="1"/>
+          </p:cNvSpPr>
+          <p:nvPr>
+            <p:ph type="subTitle" idx="1"/>
+          </p:nvPr>
         </p:nvSpPr>
         <p:spPr>
           <a:xfrm>
-            <a:off x="920834" y="4299696"/>
-            <a:ext cx="10222992" cy="80683"/>
-          </a:xfrm>
-          <a:prstGeom prst="rect">
-            <a:avLst/>
-          </a:prstGeom>
-          <a:blipFill dpi="0" rotWithShape="1">
-            <a:blip r:embed="rId2">
-              <a:alphaModFix amt="85000"/>
-              <a:lum bright="70000" contrast="-70000"/>
-              <a:extLst>
-                <a:ext uri="{BEBA8EAE-BF5A-486C-A8C5-ECC9F3942E4B}">
-                  <a14:imgProps xmlns:a14="http://schemas.microsoft.com/office/drawing/2010/main">
-                    <a14:imgLayer r:embed="rId3">
-                      <a14:imgEffect>
-                        <a14:sharpenSoften amount="61000"/>
-                      </a14:imgEffect>
-                    </a14:imgLayer>
-                  </a14:imgProps>
-                </a:ext>
-                <a:ext uri="{28A0092B-C50C-407E-A947-70E740481C1C}">
-                  <a14:useLocalDpi xmlns:a14="http://schemas.microsoft.com/office/drawing/2010/main" val="0"/>
-                </a:ext>
-              </a:extLst>
-            </a:blip>
-            <a:srcRect/>
-            <a:tile tx="0" ty="-717550" sx="92000" sy="89000" flip="xy" algn="ctr"/>
-          </a:blipFill>
-          <a:ln>
-            <a:noFill/>
-          </a:ln>
-        </p:spPr>
-        <p:style>
-          <a:lnRef idx="2">
-            <a:schemeClr val="accent1">
-              <a:shade val="50000"/>
-            </a:schemeClr>
-          </a:lnRef>
-          <a:fillRef idx="1">
-            <a:schemeClr val="accent1"/>
-          </a:fillRef>
-          <a:effectRef idx="0">
-            <a:schemeClr val="accent1"/>
-          </a:effectRef>
-          <a:fontRef idx="minor">
-            <a:schemeClr val="lt1"/>
-          </a:fontRef>
-        </p:style>
-      </p:sp>
-      <p:sp>
-        <p:nvSpPr>
-          <p:cNvPr id="9" name="Rectangle 8"/>
-          <p:cNvSpPr/>
-          <p:nvPr/>
-        </p:nvSpPr>
-        <p:spPr>
-          <a:xfrm>
-            <a:off x="920834" y="1484779"/>
-            <a:ext cx="10222992" cy="2743200"/>
-          </a:xfrm>
-          <a:prstGeom prst="rect">
-            <a:avLst/>
-          </a:prstGeom>
-          <a:blipFill dpi="0" rotWithShape="1">
-            <a:blip r:embed="rId2">
-              <a:alphaModFix amt="85000"/>
-              <a:lum bright="70000" contrast="-70000"/>
-              <a:extLst>
-                <a:ext uri="{BEBA8EAE-BF5A-486C-A8C5-ECC9F3942E4B}">
-                  <a14:imgProps xmlns:a14="http://schemas.microsoft.com/office/drawing/2010/main">
-                    <a14:imgLayer r:embed="rId3">
-                      <a14:imgEffect>
-                        <a14:sharpenSoften amount="61000"/>
-                      </a14:imgEffect>
-                    </a14:imgLayer>
-                  </a14:imgProps>
-                </a:ext>
-                <a:ext uri="{28A0092B-C50C-407E-A947-70E740481C1C}">
-                  <a14:useLocalDpi xmlns:a14="http://schemas.microsoft.com/office/drawing/2010/main" val="0"/>
-                </a:ext>
-              </a:extLst>
-            </a:blip>
-            <a:srcRect/>
-            <a:tile tx="0" ty="-704850" sx="92000" sy="89000" flip="xy" algn="ctr"/>
-          </a:blipFill>
-          <a:ln>
-            <a:noFill/>
-          </a:ln>
-        </p:spPr>
-        <p:style>
-          <a:lnRef idx="2">
-            <a:schemeClr val="accent1">
-              <a:shade val="50000"/>
-            </a:schemeClr>
-          </a:lnRef>
-          <a:fillRef idx="1">
-            <a:schemeClr val="accent1"/>
-          </a:fillRef>
-          <a:effectRef idx="0">
-            <a:schemeClr val="accent1"/>
-          </a:effectRef>
-          <a:fontRef idx="minor">
-            <a:schemeClr val="lt1"/>
-          </a:fontRef>
-        </p:style>
-      </p:sp>
-      <p:grpSp>
-        <p:nvGrpSpPr>
-          <p:cNvPr id="10" name="Group 9"/>
-          <p:cNvGrpSpPr/>
-          <p:nvPr/>
-        </p:nvGrpSpPr>
-        <p:grpSpPr>
-          <a:xfrm>
-            <a:off x="9649215" y="4068923"/>
-            <a:ext cx="1080904" cy="1080902"/>
-            <a:chOff x="9685338" y="4460675"/>
-            <a:chExt cx="1080904" cy="1080902"/>
-          </a:xfrm>
-        </p:grpSpPr>
-        <p:sp>
-          <p:nvSpPr>
-            <p:cNvPr id="11" name="Oval 10"/>
-            <p:cNvSpPr/>
-            <p:nvPr/>
-          </p:nvSpPr>
-          <p:spPr>
-            <a:xfrm>
-              <a:off x="9685338" y="4460675"/>
-              <a:ext cx="1080904" cy="1080902"/>
-            </a:xfrm>
-            <a:prstGeom prst="ellipse">
-              <a:avLst/>
-            </a:prstGeom>
-            <a:blipFill dpi="0" rotWithShape="1">
-              <a:blip r:embed="rId4">
-                <a:duotone>
-                  <a:schemeClr val="accent1">
-                    <a:shade val="45000"/>
-                    <a:satMod val="135000"/>
-                  </a:schemeClr>
-                  <a:prstClr val="white"/>
-                </a:duotone>
-                <a:extLst>
-                  <a:ext uri="{BEBA8EAE-BF5A-486C-A8C5-ECC9F3942E4B}">
-                    <a14:imgProps xmlns:a14="http://schemas.microsoft.com/office/drawing/2010/main">
-                      <a14:imgLayer r:embed="rId5">
-                        <a14:imgEffect>
-                          <a14:saturation sat="95000"/>
-                        </a14:imgEffect>
-                      </a14:imgLayer>
-                    </a14:imgProps>
-                  </a:ext>
-                </a:extLst>
-              </a:blip>
-              <a:srcRect/>
-              <a:tile tx="0" ty="0" sx="85000" sy="85000" flip="none" algn="tl"/>
-            </a:blipFill>
-            <a:ln w="25400" cap="flat" cmpd="sng" algn="ctr">
-              <a:noFill/>
-              <a:prstDash val="solid"/>
-            </a:ln>
-            <a:effectLst/>
-          </p:spPr>
-        </p:sp>
-        <p:sp>
-          <p:nvSpPr>
-            <p:cNvPr id="12" name="Oval 11"/>
-            <p:cNvSpPr/>
-            <p:nvPr/>
-          </p:nvSpPr>
-          <p:spPr>
-            <a:xfrm>
-              <a:off x="9793429" y="4568765"/>
-              <a:ext cx="864723" cy="864722"/>
-            </a:xfrm>
-            <a:prstGeom prst="ellipse">
-              <a:avLst/>
-            </a:prstGeom>
-            <a:noFill/>
-            <a:ln w="25400" cap="flat" cmpd="sng" algn="ctr">
-              <a:solidFill>
-                <a:sysClr val="window" lastClr="FFFFFF"/>
-              </a:solidFill>
-              <a:prstDash val="solid"/>
-            </a:ln>
-            <a:effectLst/>
-          </p:spPr>
-        </p:sp>
-      </p:grpSp>
-      <p:sp>
-        <p:nvSpPr>
-          <p:cNvPr id="2" name="Title 1"/>
-          <p:cNvSpPr>
-            <a:spLocks noGrp="1"/>
-          </p:cNvSpPr>
-          <p:nvPr>
-            <p:ph type="ctrTitle"/>
-          </p:nvPr>
-        </p:nvSpPr>
-        <p:spPr>
-          <a:xfrm>
-            <a:off x="1051560" y="1432223"/>
-            <a:ext cx="9966960" cy="3035808"/>
+            <a:off x="1524000" y="3602038"/>
+            <a:ext cx="9144000" cy="1655762"/>
           </a:xfrm>
         </p:spPr>
         <p:txBody>
-          <a:bodyPr anchor="ctr">
-            <a:noAutofit/>
-          </a:bodyPr>
+          <a:bodyPr/>
           <a:lstStyle>
-            <a:lvl1pPr algn="l">
-              <a:lnSpc>
-                <a:spcPct val="80000"/>
-              </a:lnSpc>
-              <a:defRPr sz="9600" cap="all" baseline="0">
-                <a:blipFill dpi="0" rotWithShape="1">
-                  <a:blip r:embed="rId4"/>
-                  <a:srcRect/>
-                  <a:tile tx="6350" ty="-127000" sx="65000" sy="64000" flip="none" algn="tl"/>
-                </a:blipFill>
-              </a:defRPr>
-            </a:lvl1pPr>
-          </a:lstStyle>
-          <a:p>
-            <a:r>
-              <a:rPr lang="en-US"/>
-              <a:t>Click to edit Master title style</a:t>
-            </a:r>
-            <a:endParaRPr lang="en-US" dirty="0"/>
-          </a:p>
-        </p:txBody>
-      </p:sp>
-      <p:sp>
-        <p:nvSpPr>
-          <p:cNvPr id="3" name="Subtitle 2"/>
-          <p:cNvSpPr>
-            <a:spLocks noGrp="1"/>
-          </p:cNvSpPr>
-          <p:nvPr>
-            <p:ph type="subTitle" idx="1"/>
-          </p:nvPr>
-        </p:nvSpPr>
-        <p:spPr>
-          <a:xfrm>
-            <a:off x="1069848" y="4389120"/>
-            <a:ext cx="7891272" cy="1069848"/>
-          </a:xfrm>
-        </p:spPr>
-        <p:txBody>
-          <a:bodyPr>
-            <a:normAutofit/>
-          </a:bodyPr>
-          <a:lstStyle>
-            <a:lvl1pPr marL="0" indent="0" algn="l">
-              <a:buNone/>
-              <a:defRPr sz="2200">
-                <a:solidFill>
-                  <a:schemeClr val="tx1"/>
-                </a:solidFill>
-              </a:defRPr>
+            <a:lvl1pPr marL="0" indent="0" algn="ctr">
+              <a:buNone/>
+              <a:defRPr sz="2400"/>
             </a:lvl1pPr>
             <a:lvl2pPr marL="457200" indent="0" algn="ctr">
               <a:buNone/>
-              <a:defRPr sz="2200"/>
+              <a:defRPr sz="2000"/>
             </a:lvl2pPr>
             <a:lvl3pPr marL="914400" indent="0" algn="ctr">
               <a:buNone/>
-              <a:defRPr sz="2200"/>
+              <a:defRPr sz="1800"/>
             </a:lvl3pPr>
             <a:lvl4pPr marL="1371600" indent="0" algn="ctr">
               <a:buNone/>
-              <a:defRPr sz="2000"/>
+              <a:defRPr sz="1600"/>
             </a:lvl4pPr>
             <a:lvl5pPr marL="1828800" indent="0" algn="ctr">
               <a:buNone/>
-              <a:defRPr sz="2000"/>
+              <a:defRPr sz="1600"/>
             </a:lvl5pPr>
             <a:lvl6pPr marL="2286000" indent="0" algn="ctr">
               <a:buNone/>
-              <a:defRPr sz="2000"/>
+              <a:defRPr sz="1600"/>
             </a:lvl6pPr>
             <a:lvl7pPr marL="2743200" indent="0" algn="ctr">
               <a:buNone/>
-              <a:defRPr sz="2000"/>
+              <a:defRPr sz="1600"/>
             </a:lvl7pPr>
             <a:lvl8pPr marL="3200400" indent="0" algn="ctr">
               <a:buNone/>
-              <a:defRPr sz="2000"/>
+              <a:defRPr sz="1600"/>
             </a:lvl8pPr>
             <a:lvl9pPr marL="3657600" indent="0" algn="ctr">
               <a:buNone/>
-              <a:defRPr sz="2000"/>
+              <a:defRPr sz="1600"/>
             </a:lvl9pPr>
           </a:lstStyle>
           <a:p>
@@ -512,13 +251,18 @@
               <a:rPr lang="en-US"/>
               <a:t>Click to edit Master subtitle style</a:t>
             </a:r>
-            <a:endParaRPr lang="en-US" dirty="0"/>
-          </a:p>
-        </p:txBody>
-      </p:sp>
-      <p:sp>
-        <p:nvSpPr>
-          <p:cNvPr id="4" name="Date Placeholder 3"/>
+          </a:p>
+        </p:txBody>
+      </p:sp>
+      <p:sp>
+        <p:nvSpPr>
+          <p:cNvPr id="4" name="Date Placeholder 3">
+            <a:extLst>
+              <a:ext uri="{FF2B5EF4-FFF2-40B4-BE49-F238E27FC236}">
+                <a16:creationId xmlns:a16="http://schemas.microsoft.com/office/drawing/2014/main" id="{6CD3AF47-926B-4595-A5E7-E702A1DE6DA3}"/>
+              </a:ext>
+            </a:extLst>
+          </p:cNvPr>
           <p:cNvSpPr>
             <a:spLocks noGrp="1"/>
           </p:cNvSpPr>
@@ -533,7 +277,7 @@
           <a:p>
             <a:fld id="{0E8CBC1A-DE79-4C0D-AFEE-07A9E8677B20}" type="datetimeFigureOut">
               <a:rPr lang="en-US" smtClean="0"/>
-              <a:t>4/3/2023</a:t>
+              <a:t>8/1/2023</a:t>
             </a:fld>
             <a:endParaRPr lang="en-US"/>
           </a:p>
@@ -541,7 +285,13 @@
       </p:sp>
       <p:sp>
         <p:nvSpPr>
-          <p:cNvPr id="5" name="Footer Placeholder 4"/>
+          <p:cNvPr id="5" name="Footer Placeholder 4">
+            <a:extLst>
+              <a:ext uri="{FF2B5EF4-FFF2-40B4-BE49-F238E27FC236}">
+                <a16:creationId xmlns:a16="http://schemas.microsoft.com/office/drawing/2014/main" id="{3B0C72A4-E51D-4771-9D8A-5B94859A877F}"/>
+              </a:ext>
+            </a:extLst>
+          </p:cNvPr>
           <p:cNvSpPr>
             <a:spLocks noGrp="1"/>
           </p:cNvSpPr>
@@ -560,7 +310,13 @@
       </p:sp>
       <p:sp>
         <p:nvSpPr>
-          <p:cNvPr id="6" name="Slide Number Placeholder 5"/>
+          <p:cNvPr id="6" name="Slide Number Placeholder 5">
+            <a:extLst>
+              <a:ext uri="{FF2B5EF4-FFF2-40B4-BE49-F238E27FC236}">
+                <a16:creationId xmlns:a16="http://schemas.microsoft.com/office/drawing/2014/main" id="{A372C2B7-42E8-4FBA-92CC-9504538EECB4}"/>
+              </a:ext>
+            </a:extLst>
+          </p:cNvPr>
           <p:cNvSpPr>
             <a:spLocks noGrp="1"/>
           </p:cNvSpPr>
@@ -568,19 +324,10 @@
             <p:ph type="sldNum" sz="quarter" idx="12"/>
           </p:nvPr>
         </p:nvSpPr>
-        <p:spPr>
-          <a:xfrm>
-            <a:off x="9592733" y="4289334"/>
-            <a:ext cx="1193868" cy="640080"/>
-          </a:xfrm>
-        </p:spPr>
-        <p:txBody>
-          <a:bodyPr/>
-          <a:lstStyle>
-            <a:lvl1pPr>
-              <a:defRPr sz="2800"/>
-            </a:lvl1pPr>
-          </a:lstStyle>
+        <p:spPr/>
+        <p:txBody>
+          <a:bodyPr/>
+          <a:lstStyle/>
           <a:p>
             <a:fld id="{0E0C9589-D6C4-4706-A468-E2FBCE196867}" type="slidenum">
               <a:rPr lang="en-US" smtClean="0"/>
@@ -593,7 +340,7 @@
     </p:spTree>
     <p:extLst>
       <p:ext uri="{BB962C8B-B14F-4D97-AF65-F5344CB8AC3E}">
-        <p14:creationId xmlns:p14="http://schemas.microsoft.com/office/powerpoint/2010/main" val="3510634111"/>
+        <p14:creationId xmlns:p14="http://schemas.microsoft.com/office/powerpoint/2010/main" val="239313167"/>
       </p:ext>
     </p:extLst>
   </p:cSld>
@@ -622,7 +369,13 @@
       </p:grpSpPr>
       <p:sp>
         <p:nvSpPr>
-          <p:cNvPr id="2" name="Title 1"/>
+          <p:cNvPr id="2" name="Title 1">
+            <a:extLst>
+              <a:ext uri="{FF2B5EF4-FFF2-40B4-BE49-F238E27FC236}">
+                <a16:creationId xmlns:a16="http://schemas.microsoft.com/office/drawing/2014/main" id="{20339D6C-00A2-467E-9E75-7E2C81D6972C}"/>
+              </a:ext>
+            </a:extLst>
+          </p:cNvPr>
           <p:cNvSpPr>
             <a:spLocks noGrp="1"/>
           </p:cNvSpPr>
@@ -639,13 +392,18 @@
               <a:rPr lang="en-US"/>
               <a:t>Click to edit Master title style</a:t>
             </a:r>
-            <a:endParaRPr lang="en-US" dirty="0"/>
-          </a:p>
-        </p:txBody>
-      </p:sp>
-      <p:sp>
-        <p:nvSpPr>
-          <p:cNvPr id="3" name="Vertical Text Placeholder 2"/>
+          </a:p>
+        </p:txBody>
+      </p:sp>
+      <p:sp>
+        <p:nvSpPr>
+          <p:cNvPr id="3" name="Vertical Text Placeholder 2">
+            <a:extLst>
+              <a:ext uri="{FF2B5EF4-FFF2-40B4-BE49-F238E27FC236}">
+                <a16:creationId xmlns:a16="http://schemas.microsoft.com/office/drawing/2014/main" id="{90D57D7D-6063-493D-979C-E53BE8159365}"/>
+              </a:ext>
+            </a:extLst>
+          </p:cNvPr>
           <p:cNvSpPr>
             <a:spLocks noGrp="1"/>
           </p:cNvSpPr>
@@ -691,13 +449,18 @@
               <a:rPr lang="en-US"/>
               <a:t>Fifth level</a:t>
             </a:r>
-            <a:endParaRPr lang="en-US" dirty="0"/>
-          </a:p>
-        </p:txBody>
-      </p:sp>
-      <p:sp>
-        <p:nvSpPr>
-          <p:cNvPr id="4" name="Date Placeholder 3"/>
+          </a:p>
+        </p:txBody>
+      </p:sp>
+      <p:sp>
+        <p:nvSpPr>
+          <p:cNvPr id="4" name="Date Placeholder 3">
+            <a:extLst>
+              <a:ext uri="{FF2B5EF4-FFF2-40B4-BE49-F238E27FC236}">
+                <a16:creationId xmlns:a16="http://schemas.microsoft.com/office/drawing/2014/main" id="{574AE62B-06CC-475A-AD77-226C67930C80}"/>
+              </a:ext>
+            </a:extLst>
+          </p:cNvPr>
           <p:cNvSpPr>
             <a:spLocks noGrp="1"/>
           </p:cNvSpPr>
@@ -712,7 +475,7 @@
           <a:p>
             <a:fld id="{0E8CBC1A-DE79-4C0D-AFEE-07A9E8677B20}" type="datetimeFigureOut">
               <a:rPr lang="en-US" smtClean="0"/>
-              <a:t>4/3/2023</a:t>
+              <a:t>8/1/2023</a:t>
             </a:fld>
             <a:endParaRPr lang="en-US"/>
           </a:p>
@@ -720,7 +483,13 @@
       </p:sp>
       <p:sp>
         <p:nvSpPr>
-          <p:cNvPr id="5" name="Footer Placeholder 4"/>
+          <p:cNvPr id="5" name="Footer Placeholder 4">
+            <a:extLst>
+              <a:ext uri="{FF2B5EF4-FFF2-40B4-BE49-F238E27FC236}">
+                <a16:creationId xmlns:a16="http://schemas.microsoft.com/office/drawing/2014/main" id="{8307492D-B207-447D-95DC-18BC78E6F22B}"/>
+              </a:ext>
+            </a:extLst>
+          </p:cNvPr>
           <p:cNvSpPr>
             <a:spLocks noGrp="1"/>
           </p:cNvSpPr>
@@ -739,7 +508,13 @@
       </p:sp>
       <p:sp>
         <p:nvSpPr>
-          <p:cNvPr id="6" name="Slide Number Placeholder 5"/>
+          <p:cNvPr id="6" name="Slide Number Placeholder 5">
+            <a:extLst>
+              <a:ext uri="{FF2B5EF4-FFF2-40B4-BE49-F238E27FC236}">
+                <a16:creationId xmlns:a16="http://schemas.microsoft.com/office/drawing/2014/main" id="{349658CB-879F-426B-974C-764615CB3992}"/>
+              </a:ext>
+            </a:extLst>
+          </p:cNvPr>
           <p:cNvSpPr>
             <a:spLocks noGrp="1"/>
           </p:cNvSpPr>
@@ -763,7 +538,7 @@
     </p:spTree>
     <p:extLst>
       <p:ext uri="{BB962C8B-B14F-4D97-AF65-F5344CB8AC3E}">
-        <p14:creationId xmlns:p14="http://schemas.microsoft.com/office/powerpoint/2010/main" val="200100744"/>
+        <p14:creationId xmlns:p14="http://schemas.microsoft.com/office/powerpoint/2010/main" val="2681272265"/>
       </p:ext>
     </p:extLst>
   </p:cSld>
@@ -792,7 +567,13 @@
       </p:grpSpPr>
       <p:sp>
         <p:nvSpPr>
-          <p:cNvPr id="2" name="Vertical Title 1"/>
+          <p:cNvPr id="2" name="Vertical Title 1">
+            <a:extLst>
+              <a:ext uri="{FF2B5EF4-FFF2-40B4-BE49-F238E27FC236}">
+                <a16:creationId xmlns:a16="http://schemas.microsoft.com/office/drawing/2014/main" id="{80D30277-3E35-4D70-A699-BEC2A7BB966C}"/>
+              </a:ext>
+            </a:extLst>
+          </p:cNvPr>
           <p:cNvSpPr>
             <a:spLocks noGrp="1"/>
           </p:cNvSpPr>
@@ -802,8 +583,8 @@
         </p:nvSpPr>
         <p:spPr>
           <a:xfrm>
-            <a:off x="8724900" y="533400"/>
-            <a:ext cx="2552700" cy="5638800"/>
+            <a:off x="8724900" y="365125"/>
+            <a:ext cx="2628900" cy="5811838"/>
           </a:xfrm>
         </p:spPr>
         <p:txBody>
@@ -814,13 +595,18 @@
               <a:rPr lang="en-US"/>
               <a:t>Click to edit Master title style</a:t>
             </a:r>
-            <a:endParaRPr lang="en-US" dirty="0"/>
-          </a:p>
-        </p:txBody>
-      </p:sp>
-      <p:sp>
-        <p:nvSpPr>
-          <p:cNvPr id="3" name="Vertical Text Placeholder 2"/>
+          </a:p>
+        </p:txBody>
+      </p:sp>
+      <p:sp>
+        <p:nvSpPr>
+          <p:cNvPr id="3" name="Vertical Text Placeholder 2">
+            <a:extLst>
+              <a:ext uri="{FF2B5EF4-FFF2-40B4-BE49-F238E27FC236}">
+                <a16:creationId xmlns:a16="http://schemas.microsoft.com/office/drawing/2014/main" id="{5508866F-51DD-44A9-A68E-AB5126FDD566}"/>
+              </a:ext>
+            </a:extLst>
+          </p:cNvPr>
           <p:cNvSpPr>
             <a:spLocks noGrp="1"/>
           </p:cNvSpPr>
@@ -830,8 +616,8 @@
         </p:nvSpPr>
         <p:spPr>
           <a:xfrm>
-            <a:off x="1066800" y="533400"/>
-            <a:ext cx="7505700" cy="5638800"/>
+            <a:off x="838200" y="365125"/>
+            <a:ext cx="7734300" cy="5811838"/>
           </a:xfrm>
         </p:spPr>
         <p:txBody>
@@ -871,13 +657,18 @@
               <a:rPr lang="en-US"/>
               <a:t>Fifth level</a:t>
             </a:r>
-            <a:endParaRPr lang="en-US" dirty="0"/>
-          </a:p>
-        </p:txBody>
-      </p:sp>
-      <p:sp>
-        <p:nvSpPr>
-          <p:cNvPr id="4" name="Date Placeholder 3"/>
+          </a:p>
+        </p:txBody>
+      </p:sp>
+      <p:sp>
+        <p:nvSpPr>
+          <p:cNvPr id="4" name="Date Placeholder 3">
+            <a:extLst>
+              <a:ext uri="{FF2B5EF4-FFF2-40B4-BE49-F238E27FC236}">
+                <a16:creationId xmlns:a16="http://schemas.microsoft.com/office/drawing/2014/main" id="{1CCF276B-562A-448E-8681-FD9A1159C8DA}"/>
+              </a:ext>
+            </a:extLst>
+          </p:cNvPr>
           <p:cNvSpPr>
             <a:spLocks noGrp="1"/>
           </p:cNvSpPr>
@@ -892,7 +683,7 @@
           <a:p>
             <a:fld id="{0E8CBC1A-DE79-4C0D-AFEE-07A9E8677B20}" type="datetimeFigureOut">
               <a:rPr lang="en-US" smtClean="0"/>
-              <a:t>4/3/2023</a:t>
+              <a:t>8/1/2023</a:t>
             </a:fld>
             <a:endParaRPr lang="en-US"/>
           </a:p>
@@ -900,7 +691,13 @@
       </p:sp>
       <p:sp>
         <p:nvSpPr>
-          <p:cNvPr id="5" name="Footer Placeholder 4"/>
+          <p:cNvPr id="5" name="Footer Placeholder 4">
+            <a:extLst>
+              <a:ext uri="{FF2B5EF4-FFF2-40B4-BE49-F238E27FC236}">
+                <a16:creationId xmlns:a16="http://schemas.microsoft.com/office/drawing/2014/main" id="{A31B3917-C1F3-4929-9546-8B4B6B4A8BB3}"/>
+              </a:ext>
+            </a:extLst>
+          </p:cNvPr>
           <p:cNvSpPr>
             <a:spLocks noGrp="1"/>
           </p:cNvSpPr>
@@ -919,7 +716,13 @@
       </p:sp>
       <p:sp>
         <p:nvSpPr>
-          <p:cNvPr id="6" name="Slide Number Placeholder 5"/>
+          <p:cNvPr id="6" name="Slide Number Placeholder 5">
+            <a:extLst>
+              <a:ext uri="{FF2B5EF4-FFF2-40B4-BE49-F238E27FC236}">
+                <a16:creationId xmlns:a16="http://schemas.microsoft.com/office/drawing/2014/main" id="{C3BE1EFB-CCA9-45A1-BC17-ECD4682BD29E}"/>
+              </a:ext>
+            </a:extLst>
+          </p:cNvPr>
           <p:cNvSpPr>
             <a:spLocks noGrp="1"/>
           </p:cNvSpPr>
@@ -943,7 +746,7 @@
     </p:spTree>
     <p:extLst>
       <p:ext uri="{BB962C8B-B14F-4D97-AF65-F5344CB8AC3E}">
-        <p14:creationId xmlns:p14="http://schemas.microsoft.com/office/powerpoint/2010/main" val="4030282894"/>
+        <p14:creationId xmlns:p14="http://schemas.microsoft.com/office/powerpoint/2010/main" val="4052231847"/>
       </p:ext>
     </p:extLst>
   </p:cSld>
@@ -972,7 +775,13 @@
       </p:grpSpPr>
       <p:sp>
         <p:nvSpPr>
-          <p:cNvPr id="2" name="Title 1"/>
+          <p:cNvPr id="2" name="Title 1">
+            <a:extLst>
+              <a:ext uri="{FF2B5EF4-FFF2-40B4-BE49-F238E27FC236}">
+                <a16:creationId xmlns:a16="http://schemas.microsoft.com/office/drawing/2014/main" id="{4BE8BC41-003B-48BD-B886-D8C1526F4934}"/>
+              </a:ext>
+            </a:extLst>
+          </p:cNvPr>
           <p:cNvSpPr>
             <a:spLocks noGrp="1"/>
           </p:cNvSpPr>
@@ -989,13 +798,18 @@
               <a:rPr lang="en-US"/>
               <a:t>Click to edit Master title style</a:t>
             </a:r>
-            <a:endParaRPr lang="en-US" dirty="0"/>
-          </a:p>
-        </p:txBody>
-      </p:sp>
-      <p:sp>
-        <p:nvSpPr>
-          <p:cNvPr id="3" name="Content Placeholder 2"/>
+          </a:p>
+        </p:txBody>
+      </p:sp>
+      <p:sp>
+        <p:nvSpPr>
+          <p:cNvPr id="3" name="Content Placeholder 2">
+            <a:extLst>
+              <a:ext uri="{FF2B5EF4-FFF2-40B4-BE49-F238E27FC236}">
+                <a16:creationId xmlns:a16="http://schemas.microsoft.com/office/drawing/2014/main" id="{6116523A-9702-4818-8669-85AEF7358D6F}"/>
+              </a:ext>
+            </a:extLst>
+          </p:cNvPr>
           <p:cNvSpPr>
             <a:spLocks noGrp="1"/>
           </p:cNvSpPr>
@@ -1041,13 +855,18 @@
               <a:rPr lang="en-US"/>
               <a:t>Fifth level</a:t>
             </a:r>
-            <a:endParaRPr lang="en-US" dirty="0"/>
-          </a:p>
-        </p:txBody>
-      </p:sp>
-      <p:sp>
-        <p:nvSpPr>
-          <p:cNvPr id="4" name="Date Placeholder 3"/>
+          </a:p>
+        </p:txBody>
+      </p:sp>
+      <p:sp>
+        <p:nvSpPr>
+          <p:cNvPr id="4" name="Date Placeholder 3">
+            <a:extLst>
+              <a:ext uri="{FF2B5EF4-FFF2-40B4-BE49-F238E27FC236}">
+                <a16:creationId xmlns:a16="http://schemas.microsoft.com/office/drawing/2014/main" id="{8F2814B7-9D2B-4CBC-B5D4-FC57FF37B4E9}"/>
+              </a:ext>
+            </a:extLst>
+          </p:cNvPr>
           <p:cNvSpPr>
             <a:spLocks noGrp="1"/>
           </p:cNvSpPr>
@@ -1062,7 +881,7 @@
           <a:p>
             <a:fld id="{0E8CBC1A-DE79-4C0D-AFEE-07A9E8677B20}" type="datetimeFigureOut">
               <a:rPr lang="en-US" smtClean="0"/>
-              <a:t>4/3/2023</a:t>
+              <a:t>8/1/2023</a:t>
             </a:fld>
             <a:endParaRPr lang="en-US"/>
           </a:p>
@@ -1070,7 +889,13 @@
       </p:sp>
       <p:sp>
         <p:nvSpPr>
-          <p:cNvPr id="5" name="Footer Placeholder 4"/>
+          <p:cNvPr id="5" name="Footer Placeholder 4">
+            <a:extLst>
+              <a:ext uri="{FF2B5EF4-FFF2-40B4-BE49-F238E27FC236}">
+                <a16:creationId xmlns:a16="http://schemas.microsoft.com/office/drawing/2014/main" id="{DE313DB5-5053-40A5-A808-1D954C367DF1}"/>
+              </a:ext>
+            </a:extLst>
+          </p:cNvPr>
           <p:cNvSpPr>
             <a:spLocks noGrp="1"/>
           </p:cNvSpPr>
@@ -1089,7 +914,13 @@
       </p:sp>
       <p:sp>
         <p:nvSpPr>
-          <p:cNvPr id="6" name="Slide Number Placeholder 5"/>
+          <p:cNvPr id="6" name="Slide Number Placeholder 5">
+            <a:extLst>
+              <a:ext uri="{FF2B5EF4-FFF2-40B4-BE49-F238E27FC236}">
+                <a16:creationId xmlns:a16="http://schemas.microsoft.com/office/drawing/2014/main" id="{CB41EB87-336C-4564-9073-9C2D07EAF2A8}"/>
+              </a:ext>
+            </a:extLst>
+          </p:cNvPr>
           <p:cNvSpPr>
             <a:spLocks noGrp="1"/>
           </p:cNvSpPr>
@@ -1113,7 +944,7 @@
     </p:spTree>
     <p:extLst>
       <p:ext uri="{BB962C8B-B14F-4D97-AF65-F5344CB8AC3E}">
-        <p14:creationId xmlns:p14="http://schemas.microsoft.com/office/powerpoint/2010/main" val="1154201971"/>
+        <p14:creationId xmlns:p14="http://schemas.microsoft.com/office/powerpoint/2010/main" val="2042359439"/>
       </p:ext>
     </p:extLst>
   </p:cSld>
@@ -1124,7 +955,7 @@
 </file>
 
 <file path=ppt/slideLayouts/slideLayout3.xml><?xml version="1.0" encoding="utf-8"?>
-<p:sldLayout xmlns:a="http://schemas.openxmlformats.org/drawingml/2006/main" xmlns:r="http://schemas.openxmlformats.org/officeDocument/2006/relationships" xmlns:p="http://schemas.openxmlformats.org/presentationml/2006/main" showMasterSp="0" type="secHead" preserve="1">
+<p:sldLayout xmlns:a="http://schemas.openxmlformats.org/drawingml/2006/main" xmlns:r="http://schemas.openxmlformats.org/officeDocument/2006/relationships" xmlns:p="http://schemas.openxmlformats.org/presentationml/2006/main" type="secHead" preserve="1">
   <p:cSld name="Section Header">
     <p:spTree>
       <p:nvGrpSpPr>
@@ -1142,130 +973,79 @@
       </p:grpSpPr>
       <p:sp>
         <p:nvSpPr>
-          <p:cNvPr id="7" name="Rectangle 6"/>
-          <p:cNvSpPr/>
-          <p:nvPr/>
+          <p:cNvPr id="2" name="Title 1">
+            <a:extLst>
+              <a:ext uri="{FF2B5EF4-FFF2-40B4-BE49-F238E27FC236}">
+                <a16:creationId xmlns:a16="http://schemas.microsoft.com/office/drawing/2014/main" id="{6973F753-C9D6-4733-90F8-487D7A0690A9}"/>
+              </a:ext>
+            </a:extLst>
+          </p:cNvPr>
+          <p:cNvSpPr>
+            <a:spLocks noGrp="1"/>
+          </p:cNvSpPr>
+          <p:nvPr>
+            <p:ph type="title"/>
+          </p:nvPr>
         </p:nvSpPr>
         <p:spPr>
           <a:xfrm>
-            <a:off x="0" y="4917989"/>
-            <a:ext cx="12192000" cy="1940010"/>
+            <a:off x="831850" y="1709738"/>
+            <a:ext cx="10515600" cy="2852737"/>
           </a:xfrm>
-          <a:prstGeom prst="rect">
-            <a:avLst/>
-          </a:prstGeom>
-          <a:blipFill dpi="0" rotWithShape="1">
-            <a:blip r:embed="rId2">
-              <a:alphaModFix amt="85000"/>
-              <a:lum bright="70000" contrast="-70000"/>
-              <a:extLst>
-                <a:ext uri="{BEBA8EAE-BF5A-486C-A8C5-ECC9F3942E4B}">
-                  <a14:imgProps xmlns:a14="http://schemas.microsoft.com/office/drawing/2010/main">
-                    <a14:imgLayer r:embed="rId3">
-                      <a14:imgEffect>
-                        <a14:sharpenSoften amount="61000"/>
-                      </a14:imgEffect>
-                    </a14:imgLayer>
-                  </a14:imgProps>
-                </a:ext>
-                <a:ext uri="{28A0092B-C50C-407E-A947-70E740481C1C}">
-                  <a14:useLocalDpi xmlns:a14="http://schemas.microsoft.com/office/drawing/2010/main" val="0"/>
-                </a:ext>
-              </a:extLst>
-            </a:blip>
-            <a:srcRect/>
-            <a:tile tx="0" ty="-704850" sx="92000" sy="89000" flip="xy" algn="ctr"/>
-          </a:blipFill>
-          <a:ln>
-            <a:noFill/>
-          </a:ln>
         </p:spPr>
-        <p:style>
-          <a:lnRef idx="2">
-            <a:schemeClr val="accent1">
-              <a:shade val="50000"/>
-            </a:schemeClr>
-          </a:lnRef>
-          <a:fillRef idx="1">
-            <a:schemeClr val="accent1"/>
-          </a:fillRef>
-          <a:effectRef idx="0">
-            <a:schemeClr val="accent1"/>
-          </a:effectRef>
-          <a:fontRef idx="minor">
-            <a:schemeClr val="lt1"/>
-          </a:fontRef>
-        </p:style>
-      </p:sp>
-      <p:sp>
-        <p:nvSpPr>
-          <p:cNvPr id="2" name="Title 1"/>
-          <p:cNvSpPr>
-            <a:spLocks noGrp="1"/>
-          </p:cNvSpPr>
-          <p:nvPr>
-            <p:ph type="title"/>
+        <p:txBody>
+          <a:bodyPr anchor="b"/>
+          <a:lstStyle>
+            <a:lvl1pPr>
+              <a:defRPr sz="6000"/>
+            </a:lvl1pPr>
+          </a:lstStyle>
+          <a:p>
+            <a:r>
+              <a:rPr lang="en-US"/>
+              <a:t>Click to edit Master title style</a:t>
+            </a:r>
+          </a:p>
+        </p:txBody>
+      </p:sp>
+      <p:sp>
+        <p:nvSpPr>
+          <p:cNvPr id="3" name="Text Placeholder 2">
+            <a:extLst>
+              <a:ext uri="{FF2B5EF4-FFF2-40B4-BE49-F238E27FC236}">
+                <a16:creationId xmlns:a16="http://schemas.microsoft.com/office/drawing/2014/main" id="{7B13693B-FFF2-4A65-AAFC-646E3AFDDC64}"/>
+              </a:ext>
+            </a:extLst>
+          </p:cNvPr>
+          <p:cNvSpPr>
+            <a:spLocks noGrp="1"/>
+          </p:cNvSpPr>
+          <p:nvPr>
+            <p:ph type="body" idx="1"/>
           </p:nvPr>
         </p:nvSpPr>
         <p:spPr>
           <a:xfrm>
-            <a:off x="2167128" y="1225296"/>
-            <a:ext cx="9281160" cy="3520440"/>
+            <a:off x="831850" y="4589463"/>
+            <a:ext cx="10515600" cy="1500187"/>
           </a:xfrm>
         </p:spPr>
         <p:txBody>
-          <a:bodyPr anchor="ctr">
-            <a:normAutofit/>
-          </a:bodyPr>
-          <a:lstStyle>
-            <a:lvl1pPr>
-              <a:lnSpc>
-                <a:spcPct val="80000"/>
-              </a:lnSpc>
-              <a:defRPr sz="8000" b="0"/>
-            </a:lvl1pPr>
-          </a:lstStyle>
-          <a:p>
-            <a:r>
-              <a:rPr lang="en-US"/>
-              <a:t>Click to edit Master title style</a:t>
-            </a:r>
-            <a:endParaRPr lang="en-US" dirty="0"/>
-          </a:p>
-        </p:txBody>
-      </p:sp>
-      <p:sp>
-        <p:nvSpPr>
-          <p:cNvPr id="3" name="Text Placeholder 2"/>
-          <p:cNvSpPr>
-            <a:spLocks noGrp="1"/>
-          </p:cNvSpPr>
-          <p:nvPr>
-            <p:ph type="body" idx="1"/>
-          </p:nvPr>
-        </p:nvSpPr>
-        <p:spPr>
-          <a:xfrm>
-            <a:off x="2165774" y="5020056"/>
-            <a:ext cx="9052560" cy="1066800"/>
-          </a:xfrm>
-        </p:spPr>
-        <p:txBody>
-          <a:bodyPr anchor="t">
-            <a:normAutofit/>
-          </a:bodyPr>
+          <a:bodyPr/>
           <a:lstStyle>
             <a:lvl1pPr marL="0" indent="0">
               <a:buNone/>
-              <a:defRPr sz="2000">
+              <a:defRPr sz="2400">
                 <a:solidFill>
-                  <a:schemeClr val="tx1"/>
+                  <a:schemeClr val="tx1">
+                    <a:tint val="75000"/>
+                  </a:schemeClr>
                 </a:solidFill>
               </a:defRPr>
             </a:lvl1pPr>
             <a:lvl2pPr marL="457200" indent="0">
               <a:buNone/>
-              <a:defRPr sz="1800">
+              <a:defRPr sz="2000">
                 <a:solidFill>
                   <a:schemeClr val="tx1">
                     <a:tint val="75000"/>
@@ -1275,7 +1055,7 @@
             </a:lvl2pPr>
             <a:lvl3pPr marL="914400" indent="0">
               <a:buNone/>
-              <a:defRPr sz="1600">
+              <a:defRPr sz="1800">
                 <a:solidFill>
                   <a:schemeClr val="tx1">
                     <a:tint val="75000"/>
@@ -1285,7 +1065,7 @@
             </a:lvl3pPr>
             <a:lvl4pPr marL="1371600" indent="0">
               <a:buNone/>
-              <a:defRPr sz="1400">
+              <a:defRPr sz="1600">
                 <a:solidFill>
                   <a:schemeClr val="tx1">
                     <a:tint val="75000"/>
@@ -1295,7 +1075,7 @@
             </a:lvl4pPr>
             <a:lvl5pPr marL="1828800" indent="0">
               <a:buNone/>
-              <a:defRPr sz="1400">
+              <a:defRPr sz="1600">
                 <a:solidFill>
                   <a:schemeClr val="tx1">
                     <a:tint val="75000"/>
@@ -1305,7 +1085,7 @@
             </a:lvl5pPr>
             <a:lvl6pPr marL="2286000" indent="0">
               <a:buNone/>
-              <a:defRPr sz="1400">
+              <a:defRPr sz="1600">
                 <a:solidFill>
                   <a:schemeClr val="tx1">
                     <a:tint val="75000"/>
@@ -1315,7 +1095,7 @@
             </a:lvl6pPr>
             <a:lvl7pPr marL="2743200" indent="0">
               <a:buNone/>
-              <a:defRPr sz="1400">
+              <a:defRPr sz="1600">
                 <a:solidFill>
                   <a:schemeClr val="tx1">
                     <a:tint val="75000"/>
@@ -1325,7 +1105,7 @@
             </a:lvl7pPr>
             <a:lvl8pPr marL="3200400" indent="0">
               <a:buNone/>
-              <a:defRPr sz="1400">
+              <a:defRPr sz="1600">
                 <a:solidFill>
                   <a:schemeClr val="tx1">
                     <a:tint val="75000"/>
@@ -1335,7 +1115,7 @@
             </a:lvl8pPr>
             <a:lvl9pPr marL="3657600" indent="0">
               <a:buNone/>
-              <a:defRPr sz="1400">
+              <a:defRPr sz="1600">
                 <a:solidFill>
                   <a:schemeClr val="tx1">
                     <a:tint val="75000"/>
@@ -1355,7 +1135,13 @@
       </p:sp>
       <p:sp>
         <p:nvSpPr>
-          <p:cNvPr id="4" name="Date Placeholder 3"/>
+          <p:cNvPr id="4" name="Date Placeholder 3">
+            <a:extLst>
+              <a:ext uri="{FF2B5EF4-FFF2-40B4-BE49-F238E27FC236}">
+                <a16:creationId xmlns:a16="http://schemas.microsoft.com/office/drawing/2014/main" id="{3CEFE1AF-5774-4294-840D-518DA316DD26}"/>
+              </a:ext>
+            </a:extLst>
+          </p:cNvPr>
           <p:cNvSpPr>
             <a:spLocks noGrp="1"/>
           </p:cNvSpPr>
@@ -1363,19 +1149,14 @@
             <p:ph type="dt" sz="half" idx="10"/>
           </p:nvPr>
         </p:nvSpPr>
-        <p:spPr>
-          <a:xfrm>
-            <a:off x="8593667" y="6272784"/>
-            <a:ext cx="2644309" cy="365125"/>
-          </a:xfrm>
-        </p:spPr>
+        <p:spPr/>
         <p:txBody>
           <a:bodyPr/>
           <a:lstStyle/>
           <a:p>
             <a:fld id="{0E8CBC1A-DE79-4C0D-AFEE-07A9E8677B20}" type="datetimeFigureOut">
               <a:rPr lang="en-US" smtClean="0"/>
-              <a:t>4/3/2023</a:t>
+              <a:t>8/1/2023</a:t>
             </a:fld>
             <a:endParaRPr lang="en-US"/>
           </a:p>
@@ -1383,7 +1164,13 @@
       </p:sp>
       <p:sp>
         <p:nvSpPr>
-          <p:cNvPr id="5" name="Footer Placeholder 4"/>
+          <p:cNvPr id="5" name="Footer Placeholder 4">
+            <a:extLst>
+              <a:ext uri="{FF2B5EF4-FFF2-40B4-BE49-F238E27FC236}">
+                <a16:creationId xmlns:a16="http://schemas.microsoft.com/office/drawing/2014/main" id="{A3019DA2-AC9F-400C-B116-5F957BF6CFE4}"/>
+              </a:ext>
+            </a:extLst>
+          </p:cNvPr>
           <p:cNvSpPr>
             <a:spLocks noGrp="1"/>
           </p:cNvSpPr>
@@ -1391,12 +1178,7 @@
             <p:ph type="ftr" sz="quarter" idx="11"/>
           </p:nvPr>
         </p:nvSpPr>
-        <p:spPr>
-          <a:xfrm>
-            <a:off x="2182708" y="6272784"/>
-            <a:ext cx="6327648" cy="365125"/>
-          </a:xfrm>
-        </p:spPr>
+        <p:spPr/>
         <p:txBody>
           <a:bodyPr/>
           <a:lstStyle/>
@@ -1405,93 +1187,15 @@
           </a:p>
         </p:txBody>
       </p:sp>
-      <p:grpSp>
-        <p:nvGrpSpPr>
-          <p:cNvPr id="8" name="Group 7"/>
-          <p:cNvGrpSpPr/>
-          <p:nvPr/>
-        </p:nvGrpSpPr>
-        <p:grpSpPr>
-          <a:xfrm>
-            <a:off x="897399" y="2325848"/>
-            <a:ext cx="1080904" cy="1080902"/>
-            <a:chOff x="9685338" y="4460675"/>
-            <a:chExt cx="1080904" cy="1080902"/>
-          </a:xfrm>
-        </p:grpSpPr>
-        <p:sp>
-          <p:nvSpPr>
-            <p:cNvPr id="9" name="Oval 8"/>
-            <p:cNvSpPr/>
-            <p:nvPr/>
-          </p:nvSpPr>
-          <p:spPr>
-            <a:xfrm>
-              <a:off x="9685338" y="4460675"/>
-              <a:ext cx="1080904" cy="1080902"/>
-            </a:xfrm>
-            <a:prstGeom prst="ellipse">
-              <a:avLst/>
-            </a:prstGeom>
-            <a:blipFill dpi="0" rotWithShape="1">
-              <a:blip r:embed="rId4">
-                <a:duotone>
-                  <a:schemeClr val="accent1">
-                    <a:shade val="45000"/>
-                    <a:satMod val="135000"/>
-                  </a:schemeClr>
-                  <a:prstClr val="white"/>
-                </a:duotone>
-                <a:extLst>
-                  <a:ext uri="{BEBA8EAE-BF5A-486C-A8C5-ECC9F3942E4B}">
-                    <a14:imgProps xmlns:a14="http://schemas.microsoft.com/office/drawing/2010/main">
-                      <a14:imgLayer r:embed="rId5">
-                        <a14:imgEffect>
-                          <a14:saturation sat="95000"/>
-                        </a14:imgEffect>
-                      </a14:imgLayer>
-                    </a14:imgProps>
-                  </a:ext>
-                </a:extLst>
-              </a:blip>
-              <a:srcRect/>
-              <a:tile tx="0" ty="0" sx="85000" sy="85000" flip="none" algn="tl"/>
-            </a:blipFill>
-            <a:ln w="25400" cap="flat" cmpd="sng" algn="ctr">
-              <a:noFill/>
-              <a:prstDash val="solid"/>
-            </a:ln>
-            <a:effectLst/>
-          </p:spPr>
-        </p:sp>
-        <p:sp>
-          <p:nvSpPr>
-            <p:cNvPr id="10" name="Oval 9"/>
-            <p:cNvSpPr/>
-            <p:nvPr/>
-          </p:nvSpPr>
-          <p:spPr>
-            <a:xfrm>
-              <a:off x="9793429" y="4568765"/>
-              <a:ext cx="864723" cy="864722"/>
-            </a:xfrm>
-            <a:prstGeom prst="ellipse">
-              <a:avLst/>
-            </a:prstGeom>
-            <a:noFill/>
-            <a:ln w="25400" cap="flat" cmpd="sng" algn="ctr">
-              <a:solidFill>
-                <a:sysClr val="window" lastClr="FFFFFF"/>
-              </a:solidFill>
-              <a:prstDash val="solid"/>
-            </a:ln>
-            <a:effectLst/>
-          </p:spPr>
-        </p:sp>
-      </p:grpSp>
-      <p:sp>
-        <p:nvSpPr>
-          <p:cNvPr id="6" name="Slide Number Placeholder 5"/>
+      <p:sp>
+        <p:nvSpPr>
+          <p:cNvPr id="6" name="Slide Number Placeholder 5">
+            <a:extLst>
+              <a:ext uri="{FF2B5EF4-FFF2-40B4-BE49-F238E27FC236}">
+                <a16:creationId xmlns:a16="http://schemas.microsoft.com/office/drawing/2014/main" id="{BC90537F-7A1E-407C-87A4-ACD0DAF9ACFC}"/>
+              </a:ext>
+            </a:extLst>
+          </p:cNvPr>
           <p:cNvSpPr>
             <a:spLocks noGrp="1"/>
           </p:cNvSpPr>
@@ -1499,19 +1203,10 @@
             <p:ph type="sldNum" sz="quarter" idx="12"/>
           </p:nvPr>
         </p:nvSpPr>
-        <p:spPr>
-          <a:xfrm>
-            <a:off x="843702" y="2506133"/>
-            <a:ext cx="1188298" cy="720332"/>
-          </a:xfrm>
-        </p:spPr>
-        <p:txBody>
-          <a:bodyPr/>
-          <a:lstStyle>
-            <a:lvl1pPr>
-              <a:defRPr sz="2800"/>
-            </a:lvl1pPr>
-          </a:lstStyle>
+        <p:spPr/>
+        <p:txBody>
+          <a:bodyPr/>
+          <a:lstStyle/>
           <a:p>
             <a:fld id="{0E0C9589-D6C4-4706-A468-E2FBCE196867}" type="slidenum">
               <a:rPr lang="en-US" smtClean="0"/>
@@ -1524,7 +1219,7 @@
     </p:spTree>
     <p:extLst>
       <p:ext uri="{BB962C8B-B14F-4D97-AF65-F5344CB8AC3E}">
-        <p14:creationId xmlns:p14="http://schemas.microsoft.com/office/powerpoint/2010/main" val="62751506"/>
+        <p14:creationId xmlns:p14="http://schemas.microsoft.com/office/powerpoint/2010/main" val="3812272179"/>
       </p:ext>
     </p:extLst>
   </p:cSld>
@@ -1553,7 +1248,13 @@
       </p:grpSpPr>
       <p:sp>
         <p:nvSpPr>
-          <p:cNvPr id="2" name="Title 1"/>
+          <p:cNvPr id="2" name="Title 1">
+            <a:extLst>
+              <a:ext uri="{FF2B5EF4-FFF2-40B4-BE49-F238E27FC236}">
+                <a16:creationId xmlns:a16="http://schemas.microsoft.com/office/drawing/2014/main" id="{54FE2195-2899-43F4-BB10-703782985493}"/>
+              </a:ext>
+            </a:extLst>
+          </p:cNvPr>
           <p:cNvSpPr>
             <a:spLocks noGrp="1"/>
           </p:cNvSpPr>
@@ -1570,13 +1271,18 @@
               <a:rPr lang="en-US"/>
               <a:t>Click to edit Master title style</a:t>
             </a:r>
-            <a:endParaRPr lang="en-US" dirty="0"/>
-          </a:p>
-        </p:txBody>
-      </p:sp>
-      <p:sp>
-        <p:nvSpPr>
-          <p:cNvPr id="3" name="Content Placeholder 2"/>
+          </a:p>
+        </p:txBody>
+      </p:sp>
+      <p:sp>
+        <p:nvSpPr>
+          <p:cNvPr id="3" name="Content Placeholder 2">
+            <a:extLst>
+              <a:ext uri="{FF2B5EF4-FFF2-40B4-BE49-F238E27FC236}">
+                <a16:creationId xmlns:a16="http://schemas.microsoft.com/office/drawing/2014/main" id="{9E255A27-9D0D-410D-B252-E2A4886C9FEA}"/>
+              </a:ext>
+            </a:extLst>
+          </p:cNvPr>
           <p:cNvSpPr>
             <a:spLocks noGrp="1"/>
           </p:cNvSpPr>
@@ -1586,41 +1292,13 @@
         </p:nvSpPr>
         <p:spPr>
           <a:xfrm>
-            <a:off x="1069848" y="2194560"/>
-            <a:ext cx="4754880" cy="3977640"/>
+            <a:off x="838200" y="1825625"/>
+            <a:ext cx="5181600" cy="4351338"/>
           </a:xfrm>
         </p:spPr>
         <p:txBody>
           <a:bodyPr/>
-          <a:lstStyle>
-            <a:lvl1pPr>
-              <a:defRPr sz="2000"/>
-            </a:lvl1pPr>
-            <a:lvl2pPr>
-              <a:defRPr sz="1800"/>
-            </a:lvl2pPr>
-            <a:lvl3pPr>
-              <a:defRPr sz="1600"/>
-            </a:lvl3pPr>
-            <a:lvl4pPr>
-              <a:defRPr sz="1600"/>
-            </a:lvl4pPr>
-            <a:lvl5pPr>
-              <a:defRPr sz="1600"/>
-            </a:lvl5pPr>
-            <a:lvl6pPr>
-              <a:defRPr sz="1600"/>
-            </a:lvl6pPr>
-            <a:lvl7pPr>
-              <a:defRPr sz="1600"/>
-            </a:lvl7pPr>
-            <a:lvl8pPr>
-              <a:defRPr sz="1600"/>
-            </a:lvl8pPr>
-            <a:lvl9pPr>
-              <a:defRPr sz="1600"/>
-            </a:lvl9pPr>
-          </a:lstStyle>
+          <a:lstStyle/>
           <a:p>
             <a:pPr lvl="0"/>
             <a:r>
@@ -1655,13 +1333,18 @@
               <a:rPr lang="en-US"/>
               <a:t>Fifth level</a:t>
             </a:r>
-            <a:endParaRPr lang="en-US" dirty="0"/>
-          </a:p>
-        </p:txBody>
-      </p:sp>
-      <p:sp>
-        <p:nvSpPr>
-          <p:cNvPr id="4" name="Content Placeholder 3"/>
+          </a:p>
+        </p:txBody>
+      </p:sp>
+      <p:sp>
+        <p:nvSpPr>
+          <p:cNvPr id="4" name="Content Placeholder 3">
+            <a:extLst>
+              <a:ext uri="{FF2B5EF4-FFF2-40B4-BE49-F238E27FC236}">
+                <a16:creationId xmlns:a16="http://schemas.microsoft.com/office/drawing/2014/main" id="{9146A029-62C7-4BF7-9173-0F7DF96E4F64}"/>
+              </a:ext>
+            </a:extLst>
+          </p:cNvPr>
           <p:cNvSpPr>
             <a:spLocks noGrp="1"/>
           </p:cNvSpPr>
@@ -1671,41 +1354,13 @@
         </p:nvSpPr>
         <p:spPr>
           <a:xfrm>
-            <a:off x="6364224" y="2194560"/>
-            <a:ext cx="4754880" cy="3977640"/>
+            <a:off x="6172200" y="1825625"/>
+            <a:ext cx="5181600" cy="4351338"/>
           </a:xfrm>
         </p:spPr>
         <p:txBody>
           <a:bodyPr/>
-          <a:lstStyle>
-            <a:lvl1pPr>
-              <a:defRPr sz="2000"/>
-            </a:lvl1pPr>
-            <a:lvl2pPr>
-              <a:defRPr sz="1800"/>
-            </a:lvl2pPr>
-            <a:lvl3pPr>
-              <a:defRPr sz="1600"/>
-            </a:lvl3pPr>
-            <a:lvl4pPr>
-              <a:defRPr sz="1600"/>
-            </a:lvl4pPr>
-            <a:lvl5pPr>
-              <a:defRPr sz="1600"/>
-            </a:lvl5pPr>
-            <a:lvl6pPr>
-              <a:defRPr sz="1600"/>
-            </a:lvl6pPr>
-            <a:lvl7pPr>
-              <a:defRPr sz="1600"/>
-            </a:lvl7pPr>
-            <a:lvl8pPr>
-              <a:defRPr sz="1600"/>
-            </a:lvl8pPr>
-            <a:lvl9pPr>
-              <a:defRPr sz="1600"/>
-            </a:lvl9pPr>
-          </a:lstStyle>
+          <a:lstStyle/>
           <a:p>
             <a:pPr lvl="0"/>
             <a:r>
@@ -1740,13 +1395,18 @@
               <a:rPr lang="en-US"/>
               <a:t>Fifth level</a:t>
             </a:r>
-            <a:endParaRPr lang="en-US" dirty="0"/>
-          </a:p>
-        </p:txBody>
-      </p:sp>
-      <p:sp>
-        <p:nvSpPr>
-          <p:cNvPr id="5" name="Date Placeholder 4"/>
+          </a:p>
+        </p:txBody>
+      </p:sp>
+      <p:sp>
+        <p:nvSpPr>
+          <p:cNvPr id="5" name="Date Placeholder 4">
+            <a:extLst>
+              <a:ext uri="{FF2B5EF4-FFF2-40B4-BE49-F238E27FC236}">
+                <a16:creationId xmlns:a16="http://schemas.microsoft.com/office/drawing/2014/main" id="{0B6654AC-714C-439C-AC7D-EEF48E52DE97}"/>
+              </a:ext>
+            </a:extLst>
+          </p:cNvPr>
           <p:cNvSpPr>
             <a:spLocks noGrp="1"/>
           </p:cNvSpPr>
@@ -1761,7 +1421,7 @@
           <a:p>
             <a:fld id="{0E8CBC1A-DE79-4C0D-AFEE-07A9E8677B20}" type="datetimeFigureOut">
               <a:rPr lang="en-US" smtClean="0"/>
-              <a:t>4/3/2023</a:t>
+              <a:t>8/1/2023</a:t>
             </a:fld>
             <a:endParaRPr lang="en-US"/>
           </a:p>
@@ -1769,7 +1429,13 @@
       </p:sp>
       <p:sp>
         <p:nvSpPr>
-          <p:cNvPr id="6" name="Footer Placeholder 5"/>
+          <p:cNvPr id="6" name="Footer Placeholder 5">
+            <a:extLst>
+              <a:ext uri="{FF2B5EF4-FFF2-40B4-BE49-F238E27FC236}">
+                <a16:creationId xmlns:a16="http://schemas.microsoft.com/office/drawing/2014/main" id="{46216A1D-C910-4402-A5E5-72C336105342}"/>
+              </a:ext>
+            </a:extLst>
+          </p:cNvPr>
           <p:cNvSpPr>
             <a:spLocks noGrp="1"/>
           </p:cNvSpPr>
@@ -1788,7 +1454,13 @@
       </p:sp>
       <p:sp>
         <p:nvSpPr>
-          <p:cNvPr id="7" name="Slide Number Placeholder 6"/>
+          <p:cNvPr id="7" name="Slide Number Placeholder 6">
+            <a:extLst>
+              <a:ext uri="{FF2B5EF4-FFF2-40B4-BE49-F238E27FC236}">
+                <a16:creationId xmlns:a16="http://schemas.microsoft.com/office/drawing/2014/main" id="{CD43E9FF-D3C3-4CB6-9F83-7E1957E8817E}"/>
+              </a:ext>
+            </a:extLst>
+          </p:cNvPr>
           <p:cNvSpPr>
             <a:spLocks noGrp="1"/>
           </p:cNvSpPr>
@@ -1812,7 +1484,7 @@
     </p:spTree>
     <p:extLst>
       <p:ext uri="{BB962C8B-B14F-4D97-AF65-F5344CB8AC3E}">
-        <p14:creationId xmlns:p14="http://schemas.microsoft.com/office/powerpoint/2010/main" val="2644227644"/>
+        <p14:creationId xmlns:p14="http://schemas.microsoft.com/office/powerpoint/2010/main" val="3894475008"/>
       </p:ext>
     </p:extLst>
   </p:cSld>
@@ -1841,57 +1513,65 @@
       </p:grpSpPr>
       <p:sp>
         <p:nvSpPr>
-          <p:cNvPr id="10" name="Title 9"/>
+          <p:cNvPr id="2" name="Title 1">
+            <a:extLst>
+              <a:ext uri="{FF2B5EF4-FFF2-40B4-BE49-F238E27FC236}">
+                <a16:creationId xmlns:a16="http://schemas.microsoft.com/office/drawing/2014/main" id="{6876A1C0-8167-4725-BD46-42DF60A829E4}"/>
+              </a:ext>
+            </a:extLst>
+          </p:cNvPr>
           <p:cNvSpPr>
             <a:spLocks noGrp="1"/>
           </p:cNvSpPr>
           <p:nvPr>
             <p:ph type="title"/>
-          </p:nvPr>
-        </p:nvSpPr>
-        <p:spPr/>
-        <p:txBody>
-          <a:bodyPr/>
-          <a:lstStyle/>
-          <a:p>
-            <a:r>
-              <a:rPr lang="en-US"/>
-              <a:t>Click to edit Master title style</a:t>
-            </a:r>
-            <a:endParaRPr lang="en-US" dirty="0"/>
-          </a:p>
-        </p:txBody>
-      </p:sp>
-      <p:sp>
-        <p:nvSpPr>
-          <p:cNvPr id="3" name="Text Placeholder 2"/>
-          <p:cNvSpPr>
-            <a:spLocks noGrp="1"/>
-          </p:cNvSpPr>
-          <p:nvPr>
-            <p:ph type="body" idx="1"/>
           </p:nvPr>
         </p:nvSpPr>
         <p:spPr>
           <a:xfrm>
-            <a:off x="1066800" y="2048256"/>
-            <a:ext cx="4754880" cy="640080"/>
+            <a:off x="839788" y="365125"/>
+            <a:ext cx="10515600" cy="1325563"/>
           </a:xfrm>
         </p:spPr>
         <p:txBody>
-          <a:bodyPr anchor="ctr">
-            <a:normAutofit/>
-          </a:bodyPr>
+          <a:bodyPr/>
+          <a:lstStyle/>
+          <a:p>
+            <a:r>
+              <a:rPr lang="en-US"/>
+              <a:t>Click to edit Master title style</a:t>
+            </a:r>
+          </a:p>
+        </p:txBody>
+      </p:sp>
+      <p:sp>
+        <p:nvSpPr>
+          <p:cNvPr id="3" name="Text Placeholder 2">
+            <a:extLst>
+              <a:ext uri="{FF2B5EF4-FFF2-40B4-BE49-F238E27FC236}">
+                <a16:creationId xmlns:a16="http://schemas.microsoft.com/office/drawing/2014/main" id="{73C2838B-4BDC-4C2B-BFEE-288E6B656798}"/>
+              </a:ext>
+            </a:extLst>
+          </p:cNvPr>
+          <p:cNvSpPr>
+            <a:spLocks noGrp="1"/>
+          </p:cNvSpPr>
+          <p:nvPr>
+            <p:ph type="body" idx="1"/>
+          </p:nvPr>
+        </p:nvSpPr>
+        <p:spPr>
+          <a:xfrm>
+            <a:off x="839788" y="1681163"/>
+            <a:ext cx="5157787" cy="823912"/>
+          </a:xfrm>
+        </p:spPr>
+        <p:txBody>
+          <a:bodyPr anchor="b"/>
           <a:lstStyle>
             <a:lvl1pPr marL="0" indent="0">
               <a:buNone/>
-              <a:defRPr sz="2000" b="1">
-                <a:solidFill>
-                  <a:schemeClr val="accent1">
-                    <a:lumMod val="75000"/>
-                  </a:schemeClr>
-                </a:solidFill>
-              </a:defRPr>
+              <a:defRPr sz="2400" b="1"/>
             </a:lvl1pPr>
             <a:lvl2pPr marL="457200" indent="0">
               <a:buNone/>
@@ -1937,7 +1617,13 @@
       </p:sp>
       <p:sp>
         <p:nvSpPr>
-          <p:cNvPr id="4" name="Content Placeholder 3"/>
+          <p:cNvPr id="4" name="Content Placeholder 3">
+            <a:extLst>
+              <a:ext uri="{FF2B5EF4-FFF2-40B4-BE49-F238E27FC236}">
+                <a16:creationId xmlns:a16="http://schemas.microsoft.com/office/drawing/2014/main" id="{63EBC15C-FC2D-49F3-9AAB-6114B62A3013}"/>
+              </a:ext>
+            </a:extLst>
+          </p:cNvPr>
           <p:cNvSpPr>
             <a:spLocks noGrp="1"/>
           </p:cNvSpPr>
@@ -1947,41 +1633,13 @@
         </p:nvSpPr>
         <p:spPr>
           <a:xfrm>
-            <a:off x="1069848" y="2743200"/>
-            <a:ext cx="4754880" cy="3291840"/>
+            <a:off x="839788" y="2505075"/>
+            <a:ext cx="5157787" cy="3684588"/>
           </a:xfrm>
         </p:spPr>
         <p:txBody>
           <a:bodyPr/>
-          <a:lstStyle>
-            <a:lvl1pPr>
-              <a:defRPr sz="2000"/>
-            </a:lvl1pPr>
-            <a:lvl2pPr>
-              <a:defRPr sz="1800"/>
-            </a:lvl2pPr>
-            <a:lvl3pPr>
-              <a:defRPr sz="1600"/>
-            </a:lvl3pPr>
-            <a:lvl4pPr>
-              <a:defRPr sz="1600"/>
-            </a:lvl4pPr>
-            <a:lvl5pPr>
-              <a:defRPr sz="1600"/>
-            </a:lvl5pPr>
-            <a:lvl6pPr>
-              <a:defRPr sz="1600"/>
-            </a:lvl6pPr>
-            <a:lvl7pPr>
-              <a:defRPr sz="1600"/>
-            </a:lvl7pPr>
-            <a:lvl8pPr>
-              <a:defRPr sz="1600"/>
-            </a:lvl8pPr>
-            <a:lvl9pPr>
-              <a:defRPr sz="1600"/>
-            </a:lvl9pPr>
-          </a:lstStyle>
+          <a:lstStyle/>
           <a:p>
             <a:pPr lvl="0"/>
             <a:r>
@@ -2016,13 +1674,18 @@
               <a:rPr lang="en-US"/>
               <a:t>Fifth level</a:t>
             </a:r>
-            <a:endParaRPr lang="en-US" dirty="0"/>
-          </a:p>
-        </p:txBody>
-      </p:sp>
-      <p:sp>
-        <p:nvSpPr>
-          <p:cNvPr id="5" name="Text Placeholder 4"/>
+          </a:p>
+        </p:txBody>
+      </p:sp>
+      <p:sp>
+        <p:nvSpPr>
+          <p:cNvPr id="5" name="Text Placeholder 4">
+            <a:extLst>
+              <a:ext uri="{FF2B5EF4-FFF2-40B4-BE49-F238E27FC236}">
+                <a16:creationId xmlns:a16="http://schemas.microsoft.com/office/drawing/2014/main" id="{CB951962-3AD2-49C4-9706-41FB58F716C0}"/>
+              </a:ext>
+            </a:extLst>
+          </p:cNvPr>
           <p:cNvSpPr>
             <a:spLocks noGrp="1"/>
           </p:cNvSpPr>
@@ -2032,24 +1695,16 @@
         </p:nvSpPr>
         <p:spPr>
           <a:xfrm>
-            <a:off x="6364224" y="2048256"/>
-            <a:ext cx="4754880" cy="640080"/>
+            <a:off x="6172200" y="1681163"/>
+            <a:ext cx="5183188" cy="823912"/>
           </a:xfrm>
         </p:spPr>
         <p:txBody>
-          <a:bodyPr anchor="ctr">
-            <a:normAutofit/>
-          </a:bodyPr>
+          <a:bodyPr anchor="b"/>
           <a:lstStyle>
             <a:lvl1pPr marL="0" indent="0">
               <a:buNone/>
-              <a:defRPr sz="2000" b="1">
-                <a:solidFill>
-                  <a:schemeClr val="accent1">
-                    <a:lumMod val="75000"/>
-                  </a:schemeClr>
-                </a:solidFill>
-              </a:defRPr>
+              <a:defRPr sz="2400" b="1"/>
             </a:lvl1pPr>
             <a:lvl2pPr marL="457200" indent="0">
               <a:buNone/>
@@ -2095,7 +1750,13 @@
       </p:sp>
       <p:sp>
         <p:nvSpPr>
-          <p:cNvPr id="6" name="Content Placeholder 5"/>
+          <p:cNvPr id="6" name="Content Placeholder 5">
+            <a:extLst>
+              <a:ext uri="{FF2B5EF4-FFF2-40B4-BE49-F238E27FC236}">
+                <a16:creationId xmlns:a16="http://schemas.microsoft.com/office/drawing/2014/main" id="{374FCF3C-F3A9-4BE0-B4B9-E2F92D04B479}"/>
+              </a:ext>
+            </a:extLst>
+          </p:cNvPr>
           <p:cNvSpPr>
             <a:spLocks noGrp="1"/>
           </p:cNvSpPr>
@@ -2105,41 +1766,13 @@
         </p:nvSpPr>
         <p:spPr>
           <a:xfrm>
-            <a:off x="6364224" y="2743200"/>
-            <a:ext cx="4754880" cy="3291840"/>
+            <a:off x="6172200" y="2505075"/>
+            <a:ext cx="5183188" cy="3684588"/>
           </a:xfrm>
         </p:spPr>
         <p:txBody>
           <a:bodyPr/>
-          <a:lstStyle>
-            <a:lvl1pPr>
-              <a:defRPr sz="2000"/>
-            </a:lvl1pPr>
-            <a:lvl2pPr>
-              <a:defRPr sz="1800"/>
-            </a:lvl2pPr>
-            <a:lvl3pPr>
-              <a:defRPr sz="1600"/>
-            </a:lvl3pPr>
-            <a:lvl4pPr>
-              <a:defRPr sz="1600"/>
-            </a:lvl4pPr>
-            <a:lvl5pPr>
-              <a:defRPr sz="1600"/>
-            </a:lvl5pPr>
-            <a:lvl6pPr>
-              <a:defRPr sz="1600"/>
-            </a:lvl6pPr>
-            <a:lvl7pPr>
-              <a:defRPr sz="1600"/>
-            </a:lvl7pPr>
-            <a:lvl8pPr>
-              <a:defRPr sz="1600"/>
-            </a:lvl8pPr>
-            <a:lvl9pPr>
-              <a:defRPr sz="1600"/>
-            </a:lvl9pPr>
-          </a:lstStyle>
+          <a:lstStyle/>
           <a:p>
             <a:pPr lvl="0"/>
             <a:r>
@@ -2174,13 +1807,18 @@
               <a:rPr lang="en-US"/>
               <a:t>Fifth level</a:t>
             </a:r>
-            <a:endParaRPr lang="en-US" dirty="0"/>
-          </a:p>
-        </p:txBody>
-      </p:sp>
-      <p:sp>
-        <p:nvSpPr>
-          <p:cNvPr id="7" name="Date Placeholder 6"/>
+          </a:p>
+        </p:txBody>
+      </p:sp>
+      <p:sp>
+        <p:nvSpPr>
+          <p:cNvPr id="7" name="Date Placeholder 6">
+            <a:extLst>
+              <a:ext uri="{FF2B5EF4-FFF2-40B4-BE49-F238E27FC236}">
+                <a16:creationId xmlns:a16="http://schemas.microsoft.com/office/drawing/2014/main" id="{0609FBDB-4C4B-406C-81A1-8EFBF272B9F5}"/>
+              </a:ext>
+            </a:extLst>
+          </p:cNvPr>
           <p:cNvSpPr>
             <a:spLocks noGrp="1"/>
           </p:cNvSpPr>
@@ -2195,7 +1833,7 @@
           <a:p>
             <a:fld id="{0E8CBC1A-DE79-4C0D-AFEE-07A9E8677B20}" type="datetimeFigureOut">
               <a:rPr lang="en-US" smtClean="0"/>
-              <a:t>4/3/2023</a:t>
+              <a:t>8/1/2023</a:t>
             </a:fld>
             <a:endParaRPr lang="en-US"/>
           </a:p>
@@ -2203,7 +1841,13 @@
       </p:sp>
       <p:sp>
         <p:nvSpPr>
-          <p:cNvPr id="8" name="Footer Placeholder 7"/>
+          <p:cNvPr id="8" name="Footer Placeholder 7">
+            <a:extLst>
+              <a:ext uri="{FF2B5EF4-FFF2-40B4-BE49-F238E27FC236}">
+                <a16:creationId xmlns:a16="http://schemas.microsoft.com/office/drawing/2014/main" id="{9C40A035-AB07-4520-9B2C-38CA4AFF66CB}"/>
+              </a:ext>
+            </a:extLst>
+          </p:cNvPr>
           <p:cNvSpPr>
             <a:spLocks noGrp="1"/>
           </p:cNvSpPr>
@@ -2222,7 +1866,13 @@
       </p:sp>
       <p:sp>
         <p:nvSpPr>
-          <p:cNvPr id="9" name="Slide Number Placeholder 8"/>
+          <p:cNvPr id="9" name="Slide Number Placeholder 8">
+            <a:extLst>
+              <a:ext uri="{FF2B5EF4-FFF2-40B4-BE49-F238E27FC236}">
+                <a16:creationId xmlns:a16="http://schemas.microsoft.com/office/drawing/2014/main" id="{EA409DF0-42E5-48EE-85B5-AF088A9663C1}"/>
+              </a:ext>
+            </a:extLst>
+          </p:cNvPr>
           <p:cNvSpPr>
             <a:spLocks noGrp="1"/>
           </p:cNvSpPr>
@@ -2246,7 +1896,7 @@
     </p:spTree>
     <p:extLst>
       <p:ext uri="{BB962C8B-B14F-4D97-AF65-F5344CB8AC3E}">
-        <p14:creationId xmlns:p14="http://schemas.microsoft.com/office/powerpoint/2010/main" val="4145944628"/>
+        <p14:creationId xmlns:p14="http://schemas.microsoft.com/office/powerpoint/2010/main" val="4279431420"/>
       </p:ext>
     </p:extLst>
   </p:cSld>
@@ -2275,7 +1925,13 @@
       </p:grpSpPr>
       <p:sp>
         <p:nvSpPr>
-          <p:cNvPr id="6" name="Title 5"/>
+          <p:cNvPr id="2" name="Title 1">
+            <a:extLst>
+              <a:ext uri="{FF2B5EF4-FFF2-40B4-BE49-F238E27FC236}">
+                <a16:creationId xmlns:a16="http://schemas.microsoft.com/office/drawing/2014/main" id="{2E98F2EB-D295-4B1B-9238-008F9615A131}"/>
+              </a:ext>
+            </a:extLst>
+          </p:cNvPr>
           <p:cNvSpPr>
             <a:spLocks noGrp="1"/>
           </p:cNvSpPr>
@@ -2292,13 +1948,18 @@
               <a:rPr lang="en-US"/>
               <a:t>Click to edit Master title style</a:t>
             </a:r>
-            <a:endParaRPr lang="en-US" dirty="0"/>
-          </a:p>
-        </p:txBody>
-      </p:sp>
-      <p:sp>
-        <p:nvSpPr>
-          <p:cNvPr id="3" name="Date Placeholder 2"/>
+          </a:p>
+        </p:txBody>
+      </p:sp>
+      <p:sp>
+        <p:nvSpPr>
+          <p:cNvPr id="3" name="Date Placeholder 2">
+            <a:extLst>
+              <a:ext uri="{FF2B5EF4-FFF2-40B4-BE49-F238E27FC236}">
+                <a16:creationId xmlns:a16="http://schemas.microsoft.com/office/drawing/2014/main" id="{CB5A5773-0A07-495D-B19D-8519FF4097B8}"/>
+              </a:ext>
+            </a:extLst>
+          </p:cNvPr>
           <p:cNvSpPr>
             <a:spLocks noGrp="1"/>
           </p:cNvSpPr>
@@ -2313,7 +1974,7 @@
           <a:p>
             <a:fld id="{0E8CBC1A-DE79-4C0D-AFEE-07A9E8677B20}" type="datetimeFigureOut">
               <a:rPr lang="en-US" smtClean="0"/>
-              <a:t>4/3/2023</a:t>
+              <a:t>8/1/2023</a:t>
             </a:fld>
             <a:endParaRPr lang="en-US"/>
           </a:p>
@@ -2321,7 +1982,13 @@
       </p:sp>
       <p:sp>
         <p:nvSpPr>
-          <p:cNvPr id="4" name="Footer Placeholder 3"/>
+          <p:cNvPr id="4" name="Footer Placeholder 3">
+            <a:extLst>
+              <a:ext uri="{FF2B5EF4-FFF2-40B4-BE49-F238E27FC236}">
+                <a16:creationId xmlns:a16="http://schemas.microsoft.com/office/drawing/2014/main" id="{18B802DE-BEE6-473B-8818-6A4CB21754BD}"/>
+              </a:ext>
+            </a:extLst>
+          </p:cNvPr>
           <p:cNvSpPr>
             <a:spLocks noGrp="1"/>
           </p:cNvSpPr>
@@ -2340,7 +2007,13 @@
       </p:sp>
       <p:sp>
         <p:nvSpPr>
-          <p:cNvPr id="5" name="Slide Number Placeholder 4"/>
+          <p:cNvPr id="5" name="Slide Number Placeholder 4">
+            <a:extLst>
+              <a:ext uri="{FF2B5EF4-FFF2-40B4-BE49-F238E27FC236}">
+                <a16:creationId xmlns:a16="http://schemas.microsoft.com/office/drawing/2014/main" id="{FDEA8556-CF45-4118-B237-051045A54B15}"/>
+              </a:ext>
+            </a:extLst>
+          </p:cNvPr>
           <p:cNvSpPr>
             <a:spLocks noGrp="1"/>
           </p:cNvSpPr>
@@ -2364,7 +2037,7 @@
     </p:spTree>
     <p:extLst>
       <p:ext uri="{BB962C8B-B14F-4D97-AF65-F5344CB8AC3E}">
-        <p14:creationId xmlns:p14="http://schemas.microsoft.com/office/powerpoint/2010/main" val="1042700228"/>
+        <p14:creationId xmlns:p14="http://schemas.microsoft.com/office/powerpoint/2010/main" val="1129377180"/>
       </p:ext>
     </p:extLst>
   </p:cSld>
@@ -2393,7 +2066,13 @@
       </p:grpSpPr>
       <p:sp>
         <p:nvSpPr>
-          <p:cNvPr id="2" name="Date Placeholder 1"/>
+          <p:cNvPr id="2" name="Date Placeholder 1">
+            <a:extLst>
+              <a:ext uri="{FF2B5EF4-FFF2-40B4-BE49-F238E27FC236}">
+                <a16:creationId xmlns:a16="http://schemas.microsoft.com/office/drawing/2014/main" id="{F53BA690-884C-4696-A048-9D1AF5A8879E}"/>
+              </a:ext>
+            </a:extLst>
+          </p:cNvPr>
           <p:cNvSpPr>
             <a:spLocks noGrp="1"/>
           </p:cNvSpPr>
@@ -2408,7 +2087,7 @@
           <a:p>
             <a:fld id="{0E8CBC1A-DE79-4C0D-AFEE-07A9E8677B20}" type="datetimeFigureOut">
               <a:rPr lang="en-US" smtClean="0"/>
-              <a:t>4/3/2023</a:t>
+              <a:t>8/1/2023</a:t>
             </a:fld>
             <a:endParaRPr lang="en-US"/>
           </a:p>
@@ -2416,7 +2095,13 @@
       </p:sp>
       <p:sp>
         <p:nvSpPr>
-          <p:cNvPr id="3" name="Footer Placeholder 2"/>
+          <p:cNvPr id="3" name="Footer Placeholder 2">
+            <a:extLst>
+              <a:ext uri="{FF2B5EF4-FFF2-40B4-BE49-F238E27FC236}">
+                <a16:creationId xmlns:a16="http://schemas.microsoft.com/office/drawing/2014/main" id="{AAADBC44-10EE-4E4B-897B-897BB0557D40}"/>
+              </a:ext>
+            </a:extLst>
+          </p:cNvPr>
           <p:cNvSpPr>
             <a:spLocks noGrp="1"/>
           </p:cNvSpPr>
@@ -2435,7 +2120,13 @@
       </p:sp>
       <p:sp>
         <p:nvSpPr>
-          <p:cNvPr id="4" name="Slide Number Placeholder 3"/>
+          <p:cNvPr id="4" name="Slide Number Placeholder 3">
+            <a:extLst>
+              <a:ext uri="{FF2B5EF4-FFF2-40B4-BE49-F238E27FC236}">
+                <a16:creationId xmlns:a16="http://schemas.microsoft.com/office/drawing/2014/main" id="{0245D7E7-ABF3-4D1D-AE5E-51138EA94131}"/>
+              </a:ext>
+            </a:extLst>
+          </p:cNvPr>
           <p:cNvSpPr>
             <a:spLocks noGrp="1"/>
           </p:cNvSpPr>
@@ -2459,7 +2150,7 @@
     </p:spTree>
     <p:extLst>
       <p:ext uri="{BB962C8B-B14F-4D97-AF65-F5344CB8AC3E}">
-        <p14:creationId xmlns:p14="http://schemas.microsoft.com/office/powerpoint/2010/main" val="4068440248"/>
+        <p14:creationId xmlns:p14="http://schemas.microsoft.com/office/powerpoint/2010/main" val="3273245263"/>
       </p:ext>
     </p:extLst>
   </p:cSld>
@@ -2470,7 +2161,7 @@
 </file>
 
 <file path=ppt/slideLayouts/slideLayout8.xml><?xml version="1.0" encoding="utf-8"?>
-<p:sldLayout xmlns:a="http://schemas.openxmlformats.org/drawingml/2006/main" xmlns:r="http://schemas.openxmlformats.org/officeDocument/2006/relationships" xmlns:p="http://schemas.openxmlformats.org/presentationml/2006/main" showMasterSp="0" type="objTx" preserve="1">
+<p:sldLayout xmlns:a="http://schemas.openxmlformats.org/drawingml/2006/main" xmlns:r="http://schemas.openxmlformats.org/officeDocument/2006/relationships" xmlns:p="http://schemas.openxmlformats.org/presentationml/2006/main" type="objTx" preserve="1">
   <p:cSld name="Content with Caption">
     <p:spTree>
       <p:nvGrpSpPr>
@@ -2488,140 +2179,191 @@
       </p:grpSpPr>
       <p:sp>
         <p:nvSpPr>
-          <p:cNvPr id="8" name="Rectangle 7"/>
-          <p:cNvSpPr/>
-          <p:nvPr/>
+          <p:cNvPr id="2" name="Title 1">
+            <a:extLst>
+              <a:ext uri="{FF2B5EF4-FFF2-40B4-BE49-F238E27FC236}">
+                <a16:creationId xmlns:a16="http://schemas.microsoft.com/office/drawing/2014/main" id="{00DD4414-E426-4B76-BFE4-1D18BB7E7115}"/>
+              </a:ext>
+            </a:extLst>
+          </p:cNvPr>
+          <p:cNvSpPr>
+            <a:spLocks noGrp="1"/>
+          </p:cNvSpPr>
+          <p:nvPr>
+            <p:ph type="title"/>
+          </p:nvPr>
         </p:nvSpPr>
         <p:spPr>
           <a:xfrm>
-            <a:off x="8303740" y="0"/>
-            <a:ext cx="3888259" cy="6857999"/>
+            <a:off x="839788" y="457200"/>
+            <a:ext cx="3932237" cy="1600200"/>
           </a:xfrm>
-          <a:prstGeom prst="rect">
-            <a:avLst/>
-          </a:prstGeom>
-          <a:blipFill dpi="0" rotWithShape="1">
-            <a:blip r:embed="rId2">
-              <a:alphaModFix amt="60000"/>
-              <a:lum bright="70000" contrast="-70000"/>
-              <a:extLst>
-                <a:ext uri="{BEBA8EAE-BF5A-486C-A8C5-ECC9F3942E4B}">
-                  <a14:imgProps xmlns:a14="http://schemas.microsoft.com/office/drawing/2010/main">
-                    <a14:imgLayer r:embed="rId3">
-                      <a14:imgEffect>
-                        <a14:sharpenSoften amount="61000"/>
-                      </a14:imgEffect>
-                    </a14:imgLayer>
-                  </a14:imgProps>
-                </a:ext>
-                <a:ext uri="{28A0092B-C50C-407E-A947-70E740481C1C}">
-                  <a14:useLocalDpi xmlns:a14="http://schemas.microsoft.com/office/drawing/2010/main" val="0"/>
-                </a:ext>
-              </a:extLst>
-            </a:blip>
-            <a:srcRect/>
-            <a:tile tx="0" ty="-704850" sx="92000" sy="89000" flip="xy" algn="ctr"/>
-          </a:blipFill>
-          <a:ln>
-            <a:noFill/>
-          </a:ln>
         </p:spPr>
-        <p:style>
-          <a:lnRef idx="2">
-            <a:schemeClr val="accent1">
-              <a:shade val="50000"/>
-            </a:schemeClr>
-          </a:lnRef>
-          <a:fillRef idx="1">
-            <a:schemeClr val="accent1"/>
-          </a:fillRef>
-          <a:effectRef idx="0">
-            <a:schemeClr val="accent1"/>
-          </a:effectRef>
-          <a:fontRef idx="minor">
-            <a:schemeClr val="lt1"/>
-          </a:fontRef>
-        </p:style>
-      </p:sp>
-      <p:sp>
-        <p:nvSpPr>
-          <p:cNvPr id="2" name="Title 1"/>
-          <p:cNvSpPr>
-            <a:spLocks noGrp="1"/>
-          </p:cNvSpPr>
-          <p:nvPr>
-            <p:ph type="title"/>
+        <p:txBody>
+          <a:bodyPr anchor="b"/>
+          <a:lstStyle>
+            <a:lvl1pPr>
+              <a:defRPr sz="3200"/>
+            </a:lvl1pPr>
+          </a:lstStyle>
+          <a:p>
+            <a:r>
+              <a:rPr lang="en-US"/>
+              <a:t>Click to edit Master title style</a:t>
+            </a:r>
+          </a:p>
+        </p:txBody>
+      </p:sp>
+      <p:sp>
+        <p:nvSpPr>
+          <p:cNvPr id="3" name="Content Placeholder 2">
+            <a:extLst>
+              <a:ext uri="{FF2B5EF4-FFF2-40B4-BE49-F238E27FC236}">
+                <a16:creationId xmlns:a16="http://schemas.microsoft.com/office/drawing/2014/main" id="{4477045D-8581-4654-BBB9-DDCCBF070957}"/>
+              </a:ext>
+            </a:extLst>
+          </p:cNvPr>
+          <p:cNvSpPr>
+            <a:spLocks noGrp="1"/>
+          </p:cNvSpPr>
+          <p:nvPr>
+            <p:ph idx="1"/>
           </p:nvPr>
         </p:nvSpPr>
         <p:spPr>
           <a:xfrm>
-            <a:off x="8549640" y="685800"/>
-            <a:ext cx="3200400" cy="1737360"/>
+            <a:off x="5183188" y="987425"/>
+            <a:ext cx="6172200" cy="4873625"/>
           </a:xfrm>
         </p:spPr>
         <p:txBody>
-          <a:bodyPr anchor="b">
-            <a:normAutofit/>
-          </a:bodyPr>
+          <a:bodyPr/>
           <a:lstStyle>
             <a:lvl1pPr>
-              <a:defRPr sz="3200" b="1"/>
+              <a:defRPr sz="3200"/>
             </a:lvl1pPr>
+            <a:lvl2pPr>
+              <a:defRPr sz="2800"/>
+            </a:lvl2pPr>
+            <a:lvl3pPr>
+              <a:defRPr sz="2400"/>
+            </a:lvl3pPr>
+            <a:lvl4pPr>
+              <a:defRPr sz="2000"/>
+            </a:lvl4pPr>
+            <a:lvl5pPr>
+              <a:defRPr sz="2000"/>
+            </a:lvl5pPr>
+            <a:lvl6pPr>
+              <a:defRPr sz="2000"/>
+            </a:lvl6pPr>
+            <a:lvl7pPr>
+              <a:defRPr sz="2000"/>
+            </a:lvl7pPr>
+            <a:lvl8pPr>
+              <a:defRPr sz="2000"/>
+            </a:lvl8pPr>
+            <a:lvl9pPr>
+              <a:defRPr sz="2000"/>
+            </a:lvl9pPr>
           </a:lstStyle>
           <a:p>
-            <a:r>
-              <a:rPr lang="en-US"/>
-              <a:t>Click to edit Master title style</a:t>
-            </a:r>
-            <a:endParaRPr lang="en-US" dirty="0"/>
-          </a:p>
-        </p:txBody>
-      </p:sp>
-      <p:sp>
-        <p:nvSpPr>
-          <p:cNvPr id="3" name="Content Placeholder 2"/>
-          <p:cNvSpPr>
-            <a:spLocks noGrp="1"/>
-          </p:cNvSpPr>
-          <p:nvPr>
-            <p:ph idx="1"/>
+            <a:pPr lvl="0"/>
+            <a:r>
+              <a:rPr lang="en-US"/>
+              <a:t>Click to edit Master text styles</a:t>
+            </a:r>
+          </a:p>
+          <a:p>
+            <a:pPr lvl="1"/>
+            <a:r>
+              <a:rPr lang="en-US"/>
+              <a:t>Second level</a:t>
+            </a:r>
+          </a:p>
+          <a:p>
+            <a:pPr lvl="2"/>
+            <a:r>
+              <a:rPr lang="en-US"/>
+              <a:t>Third level</a:t>
+            </a:r>
+          </a:p>
+          <a:p>
+            <a:pPr lvl="3"/>
+            <a:r>
+              <a:rPr lang="en-US"/>
+              <a:t>Fourth level</a:t>
+            </a:r>
+          </a:p>
+          <a:p>
+            <a:pPr lvl="4"/>
+            <a:r>
+              <a:rPr lang="en-US"/>
+              <a:t>Fifth level</a:t>
+            </a:r>
+          </a:p>
+        </p:txBody>
+      </p:sp>
+      <p:sp>
+        <p:nvSpPr>
+          <p:cNvPr id="4" name="Text Placeholder 3">
+            <a:extLst>
+              <a:ext uri="{FF2B5EF4-FFF2-40B4-BE49-F238E27FC236}">
+                <a16:creationId xmlns:a16="http://schemas.microsoft.com/office/drawing/2014/main" id="{AF3C4B2E-9C41-49C8-99BB-089B938E4F8D}"/>
+              </a:ext>
+            </a:extLst>
+          </p:cNvPr>
+          <p:cNvSpPr>
+            <a:spLocks noGrp="1"/>
+          </p:cNvSpPr>
+          <p:nvPr>
+            <p:ph type="body" sz="half" idx="2"/>
           </p:nvPr>
         </p:nvSpPr>
         <p:spPr>
           <a:xfrm>
-            <a:off x="838200" y="685800"/>
-            <a:ext cx="6711696" cy="5020056"/>
+            <a:off x="839788" y="2057400"/>
+            <a:ext cx="3932237" cy="3811588"/>
           </a:xfrm>
         </p:spPr>
         <p:txBody>
           <a:bodyPr/>
           <a:lstStyle>
-            <a:lvl1pPr>
-              <a:defRPr sz="2000"/>
+            <a:lvl1pPr marL="0" indent="0">
+              <a:buNone/>
+              <a:defRPr sz="1600"/>
             </a:lvl1pPr>
-            <a:lvl2pPr>
-              <a:defRPr sz="1800"/>
+            <a:lvl2pPr marL="457200" indent="0">
+              <a:buNone/>
+              <a:defRPr sz="1400"/>
             </a:lvl2pPr>
-            <a:lvl3pPr>
-              <a:defRPr sz="1600"/>
+            <a:lvl3pPr marL="914400" indent="0">
+              <a:buNone/>
+              <a:defRPr sz="1200"/>
             </a:lvl3pPr>
-            <a:lvl4pPr>
-              <a:defRPr sz="1600"/>
+            <a:lvl4pPr marL="1371600" indent="0">
+              <a:buNone/>
+              <a:defRPr sz="1000"/>
             </a:lvl4pPr>
-            <a:lvl5pPr>
-              <a:defRPr sz="1600"/>
+            <a:lvl5pPr marL="1828800" indent="0">
+              <a:buNone/>
+              <a:defRPr sz="1000"/>
             </a:lvl5pPr>
-            <a:lvl6pPr>
-              <a:defRPr sz="1600"/>
+            <a:lvl6pPr marL="2286000" indent="0">
+              <a:buNone/>
+              <a:defRPr sz="1000"/>
             </a:lvl6pPr>
-            <a:lvl7pPr>
-              <a:defRPr sz="1600"/>
+            <a:lvl7pPr marL="2743200" indent="0">
+              <a:buNone/>
+              <a:defRPr sz="1000"/>
             </a:lvl7pPr>
-            <a:lvl8pPr>
-              <a:defRPr sz="1600"/>
+            <a:lvl8pPr marL="3200400" indent="0">
+              <a:buNone/>
+              <a:defRPr sz="1000"/>
             </a:lvl8pPr>
-            <a:lvl9pPr>
-              <a:defRPr sz="1600"/>
+            <a:lvl9pPr marL="3657600" indent="0">
+              <a:buNone/>
+              <a:defRPr sz="1000"/>
             </a:lvl9pPr>
           </a:lstStyle>
           <a:p>
@@ -2631,119 +2373,17 @@
               <a:t>Click to edit Master text styles</a:t>
             </a:r>
           </a:p>
-          <a:p>
-            <a:pPr lvl="1"/>
-            <a:r>
-              <a:rPr lang="en-US"/>
-              <a:t>Second level</a:t>
-            </a:r>
-          </a:p>
-          <a:p>
-            <a:pPr lvl="2"/>
-            <a:r>
-              <a:rPr lang="en-US"/>
-              <a:t>Third level</a:t>
-            </a:r>
-          </a:p>
-          <a:p>
-            <a:pPr lvl="3"/>
-            <a:r>
-              <a:rPr lang="en-US"/>
-              <a:t>Fourth level</a:t>
-            </a:r>
-          </a:p>
-          <a:p>
-            <a:pPr lvl="4"/>
-            <a:r>
-              <a:rPr lang="en-US"/>
-              <a:t>Fifth level</a:t>
-            </a:r>
-            <a:endParaRPr lang="en-US" dirty="0"/>
-          </a:p>
-        </p:txBody>
-      </p:sp>
-      <p:sp>
-        <p:nvSpPr>
-          <p:cNvPr id="4" name="Text Placeholder 3"/>
-          <p:cNvSpPr>
-            <a:spLocks noGrp="1"/>
-          </p:cNvSpPr>
-          <p:nvPr>
-            <p:ph type="body" sz="half" idx="2"/>
-          </p:nvPr>
-        </p:nvSpPr>
-        <p:spPr>
-          <a:xfrm>
-            <a:off x="8549640" y="2423160"/>
-            <a:ext cx="3200400" cy="3291840"/>
-          </a:xfrm>
-        </p:spPr>
-        <p:txBody>
-          <a:bodyPr>
-            <a:normAutofit/>
-          </a:bodyPr>
-          <a:lstStyle>
-            <a:lvl1pPr marL="0" indent="0">
-              <a:lnSpc>
-                <a:spcPct val="100000"/>
-              </a:lnSpc>
-              <a:spcBef>
-                <a:spcPts val="1000"/>
-              </a:spcBef>
-              <a:buNone/>
-              <a:defRPr sz="1400">
-                <a:solidFill>
-                  <a:schemeClr val="accent1">
-                    <a:lumMod val="75000"/>
-                  </a:schemeClr>
-                </a:solidFill>
-              </a:defRPr>
-            </a:lvl1pPr>
-            <a:lvl2pPr marL="457200" indent="0">
-              <a:buNone/>
-              <a:defRPr sz="1200"/>
-            </a:lvl2pPr>
-            <a:lvl3pPr marL="914400" indent="0">
-              <a:buNone/>
-              <a:defRPr sz="1000"/>
-            </a:lvl3pPr>
-            <a:lvl4pPr marL="1371600" indent="0">
-              <a:buNone/>
-              <a:defRPr sz="900"/>
-            </a:lvl4pPr>
-            <a:lvl5pPr marL="1828800" indent="0">
-              <a:buNone/>
-              <a:defRPr sz="900"/>
-            </a:lvl5pPr>
-            <a:lvl6pPr marL="2286000" indent="0">
-              <a:buNone/>
-              <a:defRPr sz="900"/>
-            </a:lvl6pPr>
-            <a:lvl7pPr marL="2743200" indent="0">
-              <a:buNone/>
-              <a:defRPr sz="900"/>
-            </a:lvl7pPr>
-            <a:lvl8pPr marL="3200400" indent="0">
-              <a:buNone/>
-              <a:defRPr sz="900"/>
-            </a:lvl8pPr>
-            <a:lvl9pPr marL="3657600" indent="0">
-              <a:buNone/>
-              <a:defRPr sz="900"/>
-            </a:lvl9pPr>
-          </a:lstStyle>
-          <a:p>
-            <a:pPr lvl="0"/>
-            <a:r>
-              <a:rPr lang="en-US"/>
-              <a:t>Click to edit Master text styles</a:t>
-            </a:r>
-          </a:p>
-        </p:txBody>
-      </p:sp>
-      <p:sp>
-        <p:nvSpPr>
-          <p:cNvPr id="5" name="Date Placeholder 4"/>
+        </p:txBody>
+      </p:sp>
+      <p:sp>
+        <p:nvSpPr>
+          <p:cNvPr id="5" name="Date Placeholder 4">
+            <a:extLst>
+              <a:ext uri="{FF2B5EF4-FFF2-40B4-BE49-F238E27FC236}">
+                <a16:creationId xmlns:a16="http://schemas.microsoft.com/office/drawing/2014/main" id="{E941B84E-55DE-4F25-8BF4-5A8CD1D97A09}"/>
+              </a:ext>
+            </a:extLst>
+          </p:cNvPr>
           <p:cNvSpPr>
             <a:spLocks noGrp="1"/>
           </p:cNvSpPr>
@@ -2758,7 +2398,7 @@
           <a:p>
             <a:fld id="{0E8CBC1A-DE79-4C0D-AFEE-07A9E8677B20}" type="datetimeFigureOut">
               <a:rPr lang="en-US" smtClean="0"/>
-              <a:t>4/3/2023</a:t>
+              <a:t>8/1/2023</a:t>
             </a:fld>
             <a:endParaRPr lang="en-US"/>
           </a:p>
@@ -2766,7 +2406,13 @@
       </p:sp>
       <p:sp>
         <p:nvSpPr>
-          <p:cNvPr id="6" name="Footer Placeholder 5"/>
+          <p:cNvPr id="6" name="Footer Placeholder 5">
+            <a:extLst>
+              <a:ext uri="{FF2B5EF4-FFF2-40B4-BE49-F238E27FC236}">
+                <a16:creationId xmlns:a16="http://schemas.microsoft.com/office/drawing/2014/main" id="{B7436797-231E-46A8-978B-6681D0EBD439}"/>
+              </a:ext>
+            </a:extLst>
+          </p:cNvPr>
           <p:cNvSpPr>
             <a:spLocks noGrp="1"/>
           </p:cNvSpPr>
@@ -2783,98 +2429,15 @@
           </a:p>
         </p:txBody>
       </p:sp>
-      <p:grpSp>
-        <p:nvGrpSpPr>
-          <p:cNvPr id="9" name="Group 8"/>
-          <p:cNvGrpSpPr>
-            <a:grpSpLocks noChangeAspect="1"/>
-          </p:cNvGrpSpPr>
-          <p:nvPr/>
-        </p:nvGrpSpPr>
-        <p:grpSpPr>
-          <a:xfrm>
-            <a:off x="11401725" y="6229681"/>
-            <a:ext cx="457200" cy="457200"/>
-            <a:chOff x="11361456" y="6195813"/>
-            <a:chExt cx="548640" cy="548640"/>
-          </a:xfrm>
-        </p:grpSpPr>
-        <p:sp>
-          <p:nvSpPr>
-            <p:cNvPr id="10" name="Oval 9"/>
-            <p:cNvSpPr/>
-            <p:nvPr/>
-          </p:nvSpPr>
-          <p:spPr>
-            <a:xfrm>
-              <a:off x="11361456" y="6195813"/>
-              <a:ext cx="548640" cy="548640"/>
-            </a:xfrm>
-            <a:prstGeom prst="ellipse">
-              <a:avLst/>
-            </a:prstGeom>
-            <a:blipFill dpi="0" rotWithShape="1">
-              <a:blip r:embed="rId4">
-                <a:duotone>
-                  <a:schemeClr val="accent1">
-                    <a:shade val="45000"/>
-                    <a:satMod val="135000"/>
-                  </a:schemeClr>
-                  <a:prstClr val="white"/>
-                </a:duotone>
-                <a:extLst>
-                  <a:ext uri="{BEBA8EAE-BF5A-486C-A8C5-ECC9F3942E4B}">
-                    <a14:imgProps xmlns:a14="http://schemas.microsoft.com/office/drawing/2010/main">
-                      <a14:imgLayer r:embed="rId5">
-                        <a14:imgEffect>
-                          <a14:saturation sat="95000"/>
-                        </a14:imgEffect>
-                        <a14:imgEffect>
-                          <a14:brightnessContrast bright="-40000" contrast="20000"/>
-                        </a14:imgEffect>
-                      </a14:imgLayer>
-                    </a14:imgProps>
-                  </a:ext>
-                </a:extLst>
-              </a:blip>
-              <a:srcRect/>
-              <a:tile tx="50800" ty="0" sx="85000" sy="85000" flip="none" algn="tl"/>
-            </a:blipFill>
-            <a:ln w="25400" cap="flat" cmpd="sng" algn="ctr">
-              <a:noFill/>
-              <a:prstDash val="solid"/>
-            </a:ln>
-            <a:effectLst/>
-          </p:spPr>
-        </p:sp>
-        <p:sp>
-          <p:nvSpPr>
-            <p:cNvPr id="11" name="Oval 10"/>
-            <p:cNvSpPr/>
-            <p:nvPr/>
-          </p:nvSpPr>
-          <p:spPr>
-            <a:xfrm>
-              <a:off x="11396488" y="6230844"/>
-              <a:ext cx="478576" cy="478578"/>
-            </a:xfrm>
-            <a:prstGeom prst="ellipse">
-              <a:avLst/>
-            </a:prstGeom>
-            <a:noFill/>
-            <a:ln w="12700" cap="flat" cmpd="sng" algn="ctr">
-              <a:solidFill>
-                <a:sysClr val="window" lastClr="FFFFFF"/>
-              </a:solidFill>
-              <a:prstDash val="solid"/>
-            </a:ln>
-            <a:effectLst/>
-          </p:spPr>
-        </p:sp>
-      </p:grpSp>
-      <p:sp>
-        <p:nvSpPr>
-          <p:cNvPr id="7" name="Slide Number Placeholder 6"/>
+      <p:sp>
+        <p:nvSpPr>
+          <p:cNvPr id="7" name="Slide Number Placeholder 6">
+            <a:extLst>
+              <a:ext uri="{FF2B5EF4-FFF2-40B4-BE49-F238E27FC236}">
+                <a16:creationId xmlns:a16="http://schemas.microsoft.com/office/drawing/2014/main" id="{F5FC0FF0-F8E1-46B1-BECB-538790C07273}"/>
+              </a:ext>
+            </a:extLst>
+          </p:cNvPr>
           <p:cNvSpPr>
             <a:spLocks noGrp="1"/>
           </p:cNvSpPr>
@@ -2898,7 +2461,7 @@
     </p:spTree>
     <p:extLst>
       <p:ext uri="{BB962C8B-B14F-4D97-AF65-F5344CB8AC3E}">
-        <p14:creationId xmlns:p14="http://schemas.microsoft.com/office/powerpoint/2010/main" val="4235586709"/>
+        <p14:creationId xmlns:p14="http://schemas.microsoft.com/office/powerpoint/2010/main" val="3588199568"/>
       </p:ext>
     </p:extLst>
   </p:cSld>
@@ -2909,7 +2472,7 @@
 </file>
 
 <file path=ppt/slideLayouts/slideLayout9.xml><?xml version="1.0" encoding="utf-8"?>
-<p:sldLayout xmlns:a="http://schemas.openxmlformats.org/drawingml/2006/main" xmlns:r="http://schemas.openxmlformats.org/officeDocument/2006/relationships" xmlns:p="http://schemas.openxmlformats.org/presentationml/2006/main" showMasterSp="0" type="picTx" preserve="1">
+<p:sldLayout xmlns:a="http://schemas.openxmlformats.org/drawingml/2006/main" xmlns:r="http://schemas.openxmlformats.org/officeDocument/2006/relationships" xmlns:p="http://schemas.openxmlformats.org/presentationml/2006/main" type="picTx" preserve="1">
   <p:cSld name="Picture with Caption">
     <p:spTree>
       <p:nvGrpSpPr>
@@ -2927,119 +2490,65 @@
       </p:grpSpPr>
       <p:sp>
         <p:nvSpPr>
-          <p:cNvPr id="11" name="Rectangle 10"/>
-          <p:cNvSpPr/>
-          <p:nvPr/>
+          <p:cNvPr id="2" name="Title 1">
+            <a:extLst>
+              <a:ext uri="{FF2B5EF4-FFF2-40B4-BE49-F238E27FC236}">
+                <a16:creationId xmlns:a16="http://schemas.microsoft.com/office/drawing/2014/main" id="{FF603B6C-1ED7-4F2E-9B7E-C483EEA73FED}"/>
+              </a:ext>
+            </a:extLst>
+          </p:cNvPr>
+          <p:cNvSpPr>
+            <a:spLocks noGrp="1"/>
+          </p:cNvSpPr>
+          <p:nvPr>
+            <p:ph type="title"/>
+          </p:nvPr>
         </p:nvSpPr>
         <p:spPr>
           <a:xfrm>
-            <a:off x="8303740" y="0"/>
-            <a:ext cx="3888259" cy="6857999"/>
+            <a:off x="839788" y="457200"/>
+            <a:ext cx="3932237" cy="1600200"/>
           </a:xfrm>
-          <a:prstGeom prst="rect">
-            <a:avLst/>
-          </a:prstGeom>
-          <a:blipFill dpi="0" rotWithShape="1">
-            <a:blip r:embed="rId2">
-              <a:alphaModFix amt="60000"/>
-              <a:lum bright="70000" contrast="-70000"/>
-              <a:extLst>
-                <a:ext uri="{BEBA8EAE-BF5A-486C-A8C5-ECC9F3942E4B}">
-                  <a14:imgProps xmlns:a14="http://schemas.microsoft.com/office/drawing/2010/main">
-                    <a14:imgLayer r:embed="rId3">
-                      <a14:imgEffect>
-                        <a14:sharpenSoften amount="61000"/>
-                      </a14:imgEffect>
-                    </a14:imgLayer>
-                  </a14:imgProps>
-                </a:ext>
-                <a:ext uri="{28A0092B-C50C-407E-A947-70E740481C1C}">
-                  <a14:useLocalDpi xmlns:a14="http://schemas.microsoft.com/office/drawing/2010/main" val="0"/>
-                </a:ext>
-              </a:extLst>
-            </a:blip>
-            <a:srcRect/>
-            <a:tile tx="0" ty="-704850" sx="92000" sy="89000" flip="xy" algn="ctr"/>
-          </a:blipFill>
-          <a:ln>
-            <a:noFill/>
-          </a:ln>
         </p:spPr>
-        <p:style>
-          <a:lnRef idx="2">
-            <a:schemeClr val="accent1">
-              <a:shade val="50000"/>
-            </a:schemeClr>
-          </a:lnRef>
-          <a:fillRef idx="1">
-            <a:schemeClr val="accent1"/>
-          </a:fillRef>
-          <a:effectRef idx="0">
-            <a:schemeClr val="accent1"/>
-          </a:effectRef>
-          <a:fontRef idx="minor">
-            <a:schemeClr val="lt1"/>
-          </a:fontRef>
-        </p:style>
-      </p:sp>
-      <p:sp>
-        <p:nvSpPr>
-          <p:cNvPr id="2" name="Title 1"/>
-          <p:cNvSpPr>
-            <a:spLocks noGrp="1"/>
-          </p:cNvSpPr>
-          <p:nvPr>
-            <p:ph type="title"/>
+        <p:txBody>
+          <a:bodyPr anchor="b"/>
+          <a:lstStyle>
+            <a:lvl1pPr>
+              <a:defRPr sz="3200"/>
+            </a:lvl1pPr>
+          </a:lstStyle>
+          <a:p>
+            <a:r>
+              <a:rPr lang="en-US"/>
+              <a:t>Click to edit Master title style</a:t>
+            </a:r>
+          </a:p>
+        </p:txBody>
+      </p:sp>
+      <p:sp>
+        <p:nvSpPr>
+          <p:cNvPr id="3" name="Picture Placeholder 2">
+            <a:extLst>
+              <a:ext uri="{FF2B5EF4-FFF2-40B4-BE49-F238E27FC236}">
+                <a16:creationId xmlns:a16="http://schemas.microsoft.com/office/drawing/2014/main" id="{1E204B65-9228-43CC-BDD4-7A050989EF18}"/>
+              </a:ext>
+            </a:extLst>
+          </p:cNvPr>
+          <p:cNvSpPr>
+            <a:spLocks noGrp="1"/>
+          </p:cNvSpPr>
+          <p:nvPr>
+            <p:ph type="pic" idx="1"/>
           </p:nvPr>
         </p:nvSpPr>
         <p:spPr>
           <a:xfrm>
-            <a:off x="8549640" y="685800"/>
-            <a:ext cx="3200400" cy="1737360"/>
+            <a:off x="5183188" y="987425"/>
+            <a:ext cx="6172200" cy="4873625"/>
           </a:xfrm>
         </p:spPr>
         <p:txBody>
-          <a:bodyPr anchor="b">
-            <a:normAutofit/>
-          </a:bodyPr>
-          <a:lstStyle>
-            <a:lvl1pPr>
-              <a:defRPr sz="3200" b="1"/>
-            </a:lvl1pPr>
-          </a:lstStyle>
-          <a:p>
-            <a:r>
-              <a:rPr lang="en-US"/>
-              <a:t>Click to edit Master title style</a:t>
-            </a:r>
-            <a:endParaRPr lang="en-US" dirty="0"/>
-          </a:p>
-        </p:txBody>
-      </p:sp>
-      <p:sp>
-        <p:nvSpPr>
-          <p:cNvPr id="3" name="Picture Placeholder 2"/>
-          <p:cNvSpPr>
-            <a:spLocks noGrp="1" noChangeAspect="1"/>
-          </p:cNvSpPr>
-          <p:nvPr>
-            <p:ph type="pic" idx="1"/>
-          </p:nvPr>
-        </p:nvSpPr>
-        <p:spPr>
-          <a:xfrm>
-            <a:off x="0" y="0"/>
-            <a:ext cx="8303740" cy="6858000"/>
-          </a:xfrm>
-          <a:solidFill>
-            <a:schemeClr val="tx2">
-              <a:lumMod val="20000"/>
-              <a:lumOff val="80000"/>
-            </a:schemeClr>
-          </a:solidFill>
-        </p:spPr>
-        <p:txBody>
-          <a:bodyPr anchor="t"/>
+          <a:bodyPr/>
           <a:lstStyle>
             <a:lvl1pPr marL="0" indent="0">
               <a:buNone/>
@@ -3079,17 +2588,19 @@
             </a:lvl9pPr>
           </a:lstStyle>
           <a:p>
-            <a:r>
-              <a:rPr lang="en-US"/>
-              <a:t>Click icon to add picture</a:t>
-            </a:r>
-            <a:endParaRPr lang="en-US" dirty="0"/>
-          </a:p>
-        </p:txBody>
-      </p:sp>
-      <p:sp>
-        <p:nvSpPr>
-          <p:cNvPr id="4" name="Text Placeholder 3"/>
+            <a:endParaRPr lang="en-US"/>
+          </a:p>
+        </p:txBody>
+      </p:sp>
+      <p:sp>
+        <p:nvSpPr>
+          <p:cNvPr id="4" name="Text Placeholder 3">
+            <a:extLst>
+              <a:ext uri="{FF2B5EF4-FFF2-40B4-BE49-F238E27FC236}">
+                <a16:creationId xmlns:a16="http://schemas.microsoft.com/office/drawing/2014/main" id="{E2C88D5B-84E5-4387-A963-D9957A100508}"/>
+              </a:ext>
+            </a:extLst>
+          </p:cNvPr>
           <p:cNvSpPr>
             <a:spLocks noGrp="1"/>
           </p:cNvSpPr>
@@ -3099,62 +2610,48 @@
         </p:nvSpPr>
         <p:spPr>
           <a:xfrm>
-            <a:off x="8549640" y="2423160"/>
-            <a:ext cx="3200400" cy="3291840"/>
+            <a:off x="839788" y="2057400"/>
+            <a:ext cx="3932237" cy="3811588"/>
           </a:xfrm>
         </p:spPr>
         <p:txBody>
-          <a:bodyPr>
-            <a:normAutofit/>
-          </a:bodyPr>
+          <a:bodyPr/>
           <a:lstStyle>
             <a:lvl1pPr marL="0" indent="0">
-              <a:lnSpc>
-                <a:spcPct val="100000"/>
-              </a:lnSpc>
-              <a:spcBef>
-                <a:spcPts val="1000"/>
-              </a:spcBef>
-              <a:buNone/>
-              <a:defRPr sz="1400">
-                <a:solidFill>
-                  <a:schemeClr val="accent1">
-                    <a:lumMod val="75000"/>
-                  </a:schemeClr>
-                </a:solidFill>
-              </a:defRPr>
+              <a:buNone/>
+              <a:defRPr sz="1600"/>
             </a:lvl1pPr>
             <a:lvl2pPr marL="457200" indent="0">
               <a:buNone/>
-              <a:defRPr sz="1200"/>
+              <a:defRPr sz="1400"/>
             </a:lvl2pPr>
             <a:lvl3pPr marL="914400" indent="0">
               <a:buNone/>
-              <a:defRPr sz="1000"/>
+              <a:defRPr sz="1200"/>
             </a:lvl3pPr>
             <a:lvl4pPr marL="1371600" indent="0">
               <a:buNone/>
-              <a:defRPr sz="900"/>
+              <a:defRPr sz="1000"/>
             </a:lvl4pPr>
             <a:lvl5pPr marL="1828800" indent="0">
               <a:buNone/>
-              <a:defRPr sz="900"/>
+              <a:defRPr sz="1000"/>
             </a:lvl5pPr>
             <a:lvl6pPr marL="2286000" indent="0">
               <a:buNone/>
-              <a:defRPr sz="900"/>
+              <a:defRPr sz="1000"/>
             </a:lvl6pPr>
             <a:lvl7pPr marL="2743200" indent="0">
               <a:buNone/>
-              <a:defRPr sz="900"/>
+              <a:defRPr sz="1000"/>
             </a:lvl7pPr>
             <a:lvl8pPr marL="3200400" indent="0">
               <a:buNone/>
-              <a:defRPr sz="900"/>
+              <a:defRPr sz="1000"/>
             </a:lvl8pPr>
             <a:lvl9pPr marL="3657600" indent="0">
               <a:buNone/>
-              <a:defRPr sz="900"/>
+              <a:defRPr sz="1000"/>
             </a:lvl9pPr>
           </a:lstStyle>
           <a:p>
@@ -3168,7 +2665,13 @@
       </p:sp>
       <p:sp>
         <p:nvSpPr>
-          <p:cNvPr id="5" name="Date Placeholder 4"/>
+          <p:cNvPr id="5" name="Date Placeholder 4">
+            <a:extLst>
+              <a:ext uri="{FF2B5EF4-FFF2-40B4-BE49-F238E27FC236}">
+                <a16:creationId xmlns:a16="http://schemas.microsoft.com/office/drawing/2014/main" id="{7AF2E162-EBB0-412A-A1D0-65B0C6F30E95}"/>
+              </a:ext>
+            </a:extLst>
+          </p:cNvPr>
           <p:cNvSpPr>
             <a:spLocks noGrp="1"/>
           </p:cNvSpPr>
@@ -3183,104 +2686,46 @@
           <a:p>
             <a:fld id="{0E8CBC1A-DE79-4C0D-AFEE-07A9E8677B20}" type="datetimeFigureOut">
               <a:rPr lang="en-US" smtClean="0"/>
-              <a:t>4/3/2023</a:t>
+              <a:t>8/1/2023</a:t>
             </a:fld>
             <a:endParaRPr lang="en-US"/>
           </a:p>
         </p:txBody>
       </p:sp>
-      <p:grpSp>
-        <p:nvGrpSpPr>
-          <p:cNvPr id="8" name="Group 7"/>
-          <p:cNvGrpSpPr>
-            <a:grpSpLocks noChangeAspect="1"/>
-          </p:cNvGrpSpPr>
-          <p:nvPr/>
-        </p:nvGrpSpPr>
-        <p:grpSpPr>
-          <a:xfrm>
-            <a:off x="11401725" y="6229681"/>
-            <a:ext cx="457200" cy="457200"/>
-            <a:chOff x="11361456" y="6195813"/>
-            <a:chExt cx="548640" cy="548640"/>
-          </a:xfrm>
-        </p:grpSpPr>
-        <p:sp>
-          <p:nvSpPr>
-            <p:cNvPr id="9" name="Oval 8"/>
-            <p:cNvSpPr/>
-            <p:nvPr/>
-          </p:nvSpPr>
-          <p:spPr>
-            <a:xfrm>
-              <a:off x="11361456" y="6195813"/>
-              <a:ext cx="548640" cy="548640"/>
-            </a:xfrm>
-            <a:prstGeom prst="ellipse">
-              <a:avLst/>
-            </a:prstGeom>
-            <a:blipFill dpi="0" rotWithShape="1">
-              <a:blip r:embed="rId4">
-                <a:duotone>
-                  <a:schemeClr val="accent1">
-                    <a:shade val="45000"/>
-                    <a:satMod val="135000"/>
-                  </a:schemeClr>
-                  <a:prstClr val="white"/>
-                </a:duotone>
-                <a:extLst>
-                  <a:ext uri="{BEBA8EAE-BF5A-486C-A8C5-ECC9F3942E4B}">
-                    <a14:imgProps xmlns:a14="http://schemas.microsoft.com/office/drawing/2010/main">
-                      <a14:imgLayer r:embed="rId5">
-                        <a14:imgEffect>
-                          <a14:saturation sat="95000"/>
-                        </a14:imgEffect>
-                        <a14:imgEffect>
-                          <a14:brightnessContrast bright="-40000" contrast="20000"/>
-                        </a14:imgEffect>
-                      </a14:imgLayer>
-                    </a14:imgProps>
-                  </a:ext>
-                </a:extLst>
-              </a:blip>
-              <a:srcRect/>
-              <a:tile tx="50800" ty="0" sx="85000" sy="85000" flip="none" algn="tl"/>
-            </a:blipFill>
-            <a:ln w="25400" cap="flat" cmpd="sng" algn="ctr">
-              <a:noFill/>
-              <a:prstDash val="solid"/>
-            </a:ln>
-            <a:effectLst/>
-          </p:spPr>
-        </p:sp>
-        <p:sp>
-          <p:nvSpPr>
-            <p:cNvPr id="10" name="Oval 9"/>
-            <p:cNvSpPr/>
-            <p:nvPr/>
-          </p:nvSpPr>
-          <p:spPr>
-            <a:xfrm>
-              <a:off x="11396488" y="6230844"/>
-              <a:ext cx="478576" cy="478578"/>
-            </a:xfrm>
-            <a:prstGeom prst="ellipse">
-              <a:avLst/>
-            </a:prstGeom>
-            <a:noFill/>
-            <a:ln w="12700" cap="flat" cmpd="sng" algn="ctr">
-              <a:solidFill>
-                <a:sysClr val="window" lastClr="FFFFFF"/>
-              </a:solidFill>
-              <a:prstDash val="solid"/>
-            </a:ln>
-            <a:effectLst/>
-          </p:spPr>
-        </p:sp>
-      </p:grpSp>
-      <p:sp>
-        <p:nvSpPr>
-          <p:cNvPr id="7" name="Slide Number Placeholder 6"/>
+      <p:sp>
+        <p:nvSpPr>
+          <p:cNvPr id="6" name="Footer Placeholder 5">
+            <a:extLst>
+              <a:ext uri="{FF2B5EF4-FFF2-40B4-BE49-F238E27FC236}">
+                <a16:creationId xmlns:a16="http://schemas.microsoft.com/office/drawing/2014/main" id="{002A5607-EB22-45E6-8323-7DF7599890AE}"/>
+              </a:ext>
+            </a:extLst>
+          </p:cNvPr>
+          <p:cNvSpPr>
+            <a:spLocks noGrp="1"/>
+          </p:cNvSpPr>
+          <p:nvPr>
+            <p:ph type="ftr" sz="quarter" idx="11"/>
+          </p:nvPr>
+        </p:nvSpPr>
+        <p:spPr/>
+        <p:txBody>
+          <a:bodyPr/>
+          <a:lstStyle/>
+          <a:p>
+            <a:endParaRPr lang="en-US"/>
+          </a:p>
+        </p:txBody>
+      </p:sp>
+      <p:sp>
+        <p:nvSpPr>
+          <p:cNvPr id="7" name="Slide Number Placeholder 6">
+            <a:extLst>
+              <a:ext uri="{FF2B5EF4-FFF2-40B4-BE49-F238E27FC236}">
+                <a16:creationId xmlns:a16="http://schemas.microsoft.com/office/drawing/2014/main" id="{C93636FE-1E76-4474-A22F-BD01311CE7BE}"/>
+              </a:ext>
+            </a:extLst>
+          </p:cNvPr>
           <p:cNvSpPr>
             <a:spLocks noGrp="1"/>
           </p:cNvSpPr>
@@ -3304,7 +2749,7 @@
     </p:spTree>
     <p:extLst>
       <p:ext uri="{BB962C8B-B14F-4D97-AF65-F5344CB8AC3E}">
-        <p14:creationId xmlns:p14="http://schemas.microsoft.com/office/powerpoint/2010/main" val="3384332686"/>
+        <p14:creationId xmlns:p14="http://schemas.microsoft.com/office/powerpoint/2010/main" val="3143880023"/>
       </p:ext>
     </p:extLst>
   </p:cSld>
@@ -3338,7 +2783,13 @@
       </p:grpSpPr>
       <p:sp>
         <p:nvSpPr>
-          <p:cNvPr id="2" name="Title Placeholder 1"/>
+          <p:cNvPr id="2" name="Title Placeholder 1">
+            <a:extLst>
+              <a:ext uri="{FF2B5EF4-FFF2-40B4-BE49-F238E27FC236}">
+                <a16:creationId xmlns:a16="http://schemas.microsoft.com/office/drawing/2014/main" id="{55348A24-1F65-421D-875E-D3CADBD9B84D}"/>
+              </a:ext>
+            </a:extLst>
+          </p:cNvPr>
           <p:cNvSpPr>
             <a:spLocks noGrp="1"/>
           </p:cNvSpPr>
@@ -3348,8 +2799,8 @@
         </p:nvSpPr>
         <p:spPr>
           <a:xfrm>
-            <a:off x="1069848" y="484632"/>
-            <a:ext cx="10058400" cy="1609344"/>
+            <a:off x="838200" y="365125"/>
+            <a:ext cx="10515600" cy="1325563"/>
           </a:xfrm>
           <a:prstGeom prst="rect">
             <a:avLst/>
@@ -3365,13 +2816,18 @@
               <a:rPr lang="en-US"/>
               <a:t>Click to edit Master title style</a:t>
             </a:r>
-            <a:endParaRPr lang="en-US" dirty="0"/>
-          </a:p>
-        </p:txBody>
-      </p:sp>
-      <p:sp>
-        <p:nvSpPr>
-          <p:cNvPr id="3" name="Text Placeholder 2"/>
+          </a:p>
+        </p:txBody>
+      </p:sp>
+      <p:sp>
+        <p:nvSpPr>
+          <p:cNvPr id="3" name="Text Placeholder 2">
+            <a:extLst>
+              <a:ext uri="{FF2B5EF4-FFF2-40B4-BE49-F238E27FC236}">
+                <a16:creationId xmlns:a16="http://schemas.microsoft.com/office/drawing/2014/main" id="{84E99A41-0583-4ABB-B248-0B8528EE9C25}"/>
+              </a:ext>
+            </a:extLst>
+          </p:cNvPr>
           <p:cNvSpPr>
             <a:spLocks noGrp="1"/>
           </p:cNvSpPr>
@@ -3381,8 +2837,8 @@
         </p:nvSpPr>
         <p:spPr>
           <a:xfrm>
-            <a:off x="1069848" y="2121408"/>
-            <a:ext cx="10058400" cy="4050792"/>
+            <a:off x="838200" y="1825625"/>
+            <a:ext cx="10515600" cy="4351338"/>
           </a:xfrm>
           <a:prstGeom prst="rect">
             <a:avLst/>
@@ -3427,13 +2883,18 @@
               <a:rPr lang="en-US"/>
               <a:t>Fifth level</a:t>
             </a:r>
-            <a:endParaRPr lang="en-US" dirty="0"/>
-          </a:p>
-        </p:txBody>
-      </p:sp>
-      <p:sp>
-        <p:nvSpPr>
-          <p:cNvPr id="4" name="Date Placeholder 3"/>
+          </a:p>
+        </p:txBody>
+      </p:sp>
+      <p:sp>
+        <p:nvSpPr>
+          <p:cNvPr id="4" name="Date Placeholder 3">
+            <a:extLst>
+              <a:ext uri="{FF2B5EF4-FFF2-40B4-BE49-F238E27FC236}">
+                <a16:creationId xmlns:a16="http://schemas.microsoft.com/office/drawing/2014/main" id="{4637153D-8CD0-4327-A66D-012C03B585A4}"/>
+              </a:ext>
+            </a:extLst>
+          </p:cNvPr>
           <p:cNvSpPr>
             <a:spLocks noGrp="1"/>
           </p:cNvSpPr>
@@ -3443,8 +2904,8 @@
         </p:nvSpPr>
         <p:spPr>
           <a:xfrm>
-            <a:off x="7964424" y="6272784"/>
-            <a:ext cx="3273552" cy="365125"/>
+            <a:off x="838200" y="6356350"/>
+            <a:ext cx="2743200" cy="365125"/>
           </a:xfrm>
           <a:prstGeom prst="rect">
             <a:avLst/>
@@ -3453,10 +2914,12 @@
         <p:txBody>
           <a:bodyPr vert="horz" lIns="91440" tIns="45720" rIns="91440" bIns="45720" rtlCol="0" anchor="ctr"/>
           <a:lstStyle>
-            <a:lvl1pPr algn="r">
-              <a:defRPr sz="1100">
+            <a:lvl1pPr algn="l">
+              <a:defRPr sz="1200">
                 <a:solidFill>
-                  <a:schemeClr val="tx2"/>
+                  <a:schemeClr val="tx1">
+                    <a:tint val="75000"/>
+                  </a:schemeClr>
                 </a:solidFill>
               </a:defRPr>
             </a:lvl1pPr>
@@ -3464,7 +2927,7 @@
           <a:p>
             <a:fld id="{0E8CBC1A-DE79-4C0D-AFEE-07A9E8677B20}" type="datetimeFigureOut">
               <a:rPr lang="en-US" smtClean="0"/>
-              <a:t>4/3/2023</a:t>
+              <a:t>8/1/2023</a:t>
             </a:fld>
             <a:endParaRPr lang="en-US"/>
           </a:p>
@@ -3472,7 +2935,13 @@
       </p:sp>
       <p:sp>
         <p:nvSpPr>
-          <p:cNvPr id="5" name="Footer Placeholder 4"/>
+          <p:cNvPr id="5" name="Footer Placeholder 4">
+            <a:extLst>
+              <a:ext uri="{FF2B5EF4-FFF2-40B4-BE49-F238E27FC236}">
+                <a16:creationId xmlns:a16="http://schemas.microsoft.com/office/drawing/2014/main" id="{A7F26DE0-6872-4FC4-B29B-F83FAF1C705B}"/>
+              </a:ext>
+            </a:extLst>
+          </p:cNvPr>
           <p:cNvSpPr>
             <a:spLocks noGrp="1"/>
           </p:cNvSpPr>
@@ -3482,8 +2951,8 @@
         </p:nvSpPr>
         <p:spPr>
           <a:xfrm>
-            <a:off x="1088136" y="6272784"/>
-            <a:ext cx="6327648" cy="365125"/>
+            <a:off x="4038600" y="6356350"/>
+            <a:ext cx="4114800" cy="365125"/>
           </a:xfrm>
           <a:prstGeom prst="rect">
             <a:avLst/>
@@ -3492,10 +2961,12 @@
         <p:txBody>
           <a:bodyPr vert="horz" lIns="91440" tIns="45720" rIns="91440" bIns="45720" rtlCol="0" anchor="ctr"/>
           <a:lstStyle>
-            <a:lvl1pPr algn="l">
-              <a:defRPr sz="1100">
+            <a:lvl1pPr algn="ctr">
+              <a:defRPr sz="1200">
                 <a:solidFill>
-                  <a:schemeClr val="tx2"/>
+                  <a:schemeClr val="tx1">
+                    <a:tint val="75000"/>
+                  </a:schemeClr>
                 </a:solidFill>
               </a:defRPr>
             </a:lvl1pPr>
@@ -3505,98 +2976,15 @@
           </a:p>
         </p:txBody>
       </p:sp>
-      <p:grpSp>
-        <p:nvGrpSpPr>
-          <p:cNvPr id="7" name="Group 6"/>
-          <p:cNvGrpSpPr>
-            <a:grpSpLocks noChangeAspect="1"/>
-          </p:cNvGrpSpPr>
-          <p:nvPr/>
-        </p:nvGrpSpPr>
-        <p:grpSpPr>
-          <a:xfrm>
-            <a:off x="11401725" y="6229681"/>
-            <a:ext cx="457200" cy="457200"/>
-            <a:chOff x="11361456" y="6195813"/>
-            <a:chExt cx="548640" cy="548640"/>
-          </a:xfrm>
-        </p:grpSpPr>
-        <p:sp>
-          <p:nvSpPr>
-            <p:cNvPr id="8" name="Oval 7"/>
-            <p:cNvSpPr/>
-            <p:nvPr/>
-          </p:nvSpPr>
-          <p:spPr>
-            <a:xfrm>
-              <a:off x="11361456" y="6195813"/>
-              <a:ext cx="548640" cy="548640"/>
-            </a:xfrm>
-            <a:prstGeom prst="ellipse">
-              <a:avLst/>
-            </a:prstGeom>
-            <a:blipFill dpi="0" rotWithShape="1">
-              <a:blip r:embed="rId13">
-                <a:duotone>
-                  <a:schemeClr val="accent1">
-                    <a:shade val="45000"/>
-                    <a:satMod val="135000"/>
-                  </a:schemeClr>
-                  <a:prstClr val="white"/>
-                </a:duotone>
-                <a:extLst>
-                  <a:ext uri="{BEBA8EAE-BF5A-486C-A8C5-ECC9F3942E4B}">
-                    <a14:imgProps xmlns:a14="http://schemas.microsoft.com/office/drawing/2010/main">
-                      <a14:imgLayer r:embed="rId14">
-                        <a14:imgEffect>
-                          <a14:saturation sat="95000"/>
-                        </a14:imgEffect>
-                        <a14:imgEffect>
-                          <a14:brightnessContrast bright="-40000" contrast="20000"/>
-                        </a14:imgEffect>
-                      </a14:imgLayer>
-                    </a14:imgProps>
-                  </a:ext>
-                </a:extLst>
-              </a:blip>
-              <a:srcRect/>
-              <a:tile tx="50800" ty="0" sx="85000" sy="85000" flip="none" algn="tl"/>
-            </a:blipFill>
-            <a:ln w="25400" cap="flat" cmpd="sng" algn="ctr">
-              <a:noFill/>
-              <a:prstDash val="solid"/>
-            </a:ln>
-            <a:effectLst/>
-          </p:spPr>
-        </p:sp>
-        <p:sp>
-          <p:nvSpPr>
-            <p:cNvPr id="9" name="Oval 8"/>
-            <p:cNvSpPr/>
-            <p:nvPr/>
-          </p:nvSpPr>
-          <p:spPr>
-            <a:xfrm>
-              <a:off x="11396488" y="6230844"/>
-              <a:ext cx="478576" cy="478578"/>
-            </a:xfrm>
-            <a:prstGeom prst="ellipse">
-              <a:avLst/>
-            </a:prstGeom>
-            <a:noFill/>
-            <a:ln w="12700" cap="flat" cmpd="sng" algn="ctr">
-              <a:solidFill>
-                <a:srgbClr val="FFFFFF"/>
-              </a:solidFill>
-              <a:prstDash val="solid"/>
-            </a:ln>
-            <a:effectLst/>
-          </p:spPr>
-        </p:sp>
-      </p:grpSp>
-      <p:sp>
-        <p:nvSpPr>
-          <p:cNvPr id="6" name="Slide Number Placeholder 5"/>
+      <p:sp>
+        <p:nvSpPr>
+          <p:cNvPr id="6" name="Slide Number Placeholder 5">
+            <a:extLst>
+              <a:ext uri="{FF2B5EF4-FFF2-40B4-BE49-F238E27FC236}">
+                <a16:creationId xmlns:a16="http://schemas.microsoft.com/office/drawing/2014/main" id="{F47474E1-632B-4426-96D3-F2970C6DC117}"/>
+              </a:ext>
+            </a:extLst>
+          </p:cNvPr>
           <p:cNvSpPr>
             <a:spLocks noGrp="1"/>
           </p:cNvSpPr>
@@ -3606,8 +2994,8 @@
         </p:nvSpPr>
         <p:spPr>
           <a:xfrm>
-            <a:off x="11311128" y="6272784"/>
-            <a:ext cx="640080" cy="365125"/>
+            <a:off x="8610600" y="6356350"/>
+            <a:ext cx="2743200" cy="365125"/>
           </a:xfrm>
           <a:prstGeom prst="rect">
             <a:avLst/>
@@ -3616,12 +3004,13 @@
         <p:txBody>
           <a:bodyPr vert="horz" lIns="91440" tIns="45720" rIns="91440" bIns="45720" rtlCol="0" anchor="ctr"/>
           <a:lstStyle>
-            <a:lvl1pPr algn="ctr">
-              <a:defRPr sz="1400" b="1">
+            <a:lvl1pPr algn="r">
+              <a:defRPr sz="1200">
                 <a:solidFill>
-                  <a:srgbClr val="FFFFFF"/>
+                  <a:schemeClr val="tx1">
+                    <a:tint val="75000"/>
+                  </a:schemeClr>
                 </a:solidFill>
-                <a:latin typeface="+mj-lt"/>
               </a:defRPr>
             </a:lvl1pPr>
           </a:lstStyle>
@@ -3637,23 +3026,23 @@
     </p:spTree>
     <p:extLst>
       <p:ext uri="{BB962C8B-B14F-4D97-AF65-F5344CB8AC3E}">
-        <p14:creationId xmlns:p14="http://schemas.microsoft.com/office/powerpoint/2010/main" val="3164472313"/>
+        <p14:creationId xmlns:p14="http://schemas.microsoft.com/office/powerpoint/2010/main" val="2007218365"/>
       </p:ext>
     </p:extLst>
   </p:cSld>
   <p:clrMap bg1="lt1" tx1="dk1" bg2="lt2" tx2="dk2" accent1="accent1" accent2="accent2" accent3="accent3" accent4="accent4" accent5="accent5" accent6="accent6" hlink="hlink" folHlink="folHlink"/>
   <p:sldLayoutIdLst>
-    <p:sldLayoutId id="2147483661" r:id="rId1"/>
-    <p:sldLayoutId id="2147483662" r:id="rId2"/>
-    <p:sldLayoutId id="2147483663" r:id="rId3"/>
-    <p:sldLayoutId id="2147483664" r:id="rId4"/>
-    <p:sldLayoutId id="2147483665" r:id="rId5"/>
-    <p:sldLayoutId id="2147483666" r:id="rId6"/>
-    <p:sldLayoutId id="2147483667" r:id="rId7"/>
-    <p:sldLayoutId id="2147483668" r:id="rId8"/>
-    <p:sldLayoutId id="2147483669" r:id="rId9"/>
-    <p:sldLayoutId id="2147483670" r:id="rId10"/>
-    <p:sldLayoutId id="2147483671" r:id="rId11"/>
+    <p:sldLayoutId id="2147483673" r:id="rId1"/>
+    <p:sldLayoutId id="2147483674" r:id="rId2"/>
+    <p:sldLayoutId id="2147483675" r:id="rId3"/>
+    <p:sldLayoutId id="2147483676" r:id="rId4"/>
+    <p:sldLayoutId id="2147483677" r:id="rId5"/>
+    <p:sldLayoutId id="2147483678" r:id="rId6"/>
+    <p:sldLayoutId id="2147483679" r:id="rId7"/>
+    <p:sldLayoutId id="2147483680" r:id="rId8"/>
+    <p:sldLayoutId id="2147483681" r:id="rId9"/>
+    <p:sldLayoutId id="2147483682" r:id="rId10"/>
+    <p:sldLayoutId id="2147483683" r:id="rId11"/>
   </p:sldLayoutIdLst>
   <p:txStyles>
     <p:titleStyle>
@@ -3665,17 +3054,10 @@
           <a:spcPct val="0"/>
         </a:spcBef>
         <a:buNone/>
-        <a:defRPr sz="5400" kern="1200" cap="all" baseline="0">
-          <a:blipFill>
-            <a:blip r:embed="rId15">
-              <a:extLst>
-                <a:ext uri="{28A0092B-C50C-407E-A947-70E740481C1C}">
-                  <a14:useLocalDpi xmlns:a14="http://schemas.microsoft.com/office/drawing/2010/main" val="0"/>
-                </a:ext>
-              </a:extLst>
-            </a:blip>
-            <a:tile tx="6350" ty="-127000" sx="65000" sy="64000" flip="none" algn="tl"/>
-          </a:blipFill>
+        <a:defRPr sz="4400" kern="1200">
+          <a:solidFill>
+            <a:schemeClr val="tx1"/>
+          </a:solidFill>
           <a:latin typeface="+mj-lt"/>
           <a:ea typeface="+mj-ea"/>
           <a:cs typeface="+mj-cs"/>
@@ -3683,21 +3065,51 @@
       </a:lvl1pPr>
     </p:titleStyle>
     <p:bodyStyle>
-      <a:lvl1pPr marL="182880" indent="-182880" algn="l" defTabSz="914400" rtl="0" eaLnBrk="1" latinLnBrk="0" hangingPunct="1">
+      <a:lvl1pPr marL="228600" indent="-228600" algn="l" defTabSz="914400" rtl="0" eaLnBrk="1" latinLnBrk="0" hangingPunct="1">
         <a:lnSpc>
           <a:spcPct val="90000"/>
         </a:lnSpc>
         <a:spcBef>
-          <a:spcPts val="1200"/>
+          <a:spcPts val="1000"/>
         </a:spcBef>
-        <a:buClr>
-          <a:schemeClr val="accent1">
-            <a:lumMod val="75000"/>
-          </a:schemeClr>
-        </a:buClr>
-        <a:buSzPct val="85000"/>
-        <a:buFont typeface="Wingdings" pitchFamily="2" charset="2"/>
-        <a:buChar char="§"/>
+        <a:buFont typeface="Arial" panose="020B0604020202020204" pitchFamily="34" charset="0"/>
+        <a:buChar char="•"/>
+        <a:defRPr sz="2800" kern="1200">
+          <a:solidFill>
+            <a:schemeClr val="tx1"/>
+          </a:solidFill>
+          <a:latin typeface="+mn-lt"/>
+          <a:ea typeface="+mn-ea"/>
+          <a:cs typeface="+mn-cs"/>
+        </a:defRPr>
+      </a:lvl1pPr>
+      <a:lvl2pPr marL="685800" indent="-228600" algn="l" defTabSz="914400" rtl="0" eaLnBrk="1" latinLnBrk="0" hangingPunct="1">
+        <a:lnSpc>
+          <a:spcPct val="90000"/>
+        </a:lnSpc>
+        <a:spcBef>
+          <a:spcPts val="500"/>
+        </a:spcBef>
+        <a:buFont typeface="Arial" panose="020B0604020202020204" pitchFamily="34" charset="0"/>
+        <a:buChar char="•"/>
+        <a:defRPr sz="2400" kern="1200">
+          <a:solidFill>
+            <a:schemeClr val="tx1"/>
+          </a:solidFill>
+          <a:latin typeface="+mn-lt"/>
+          <a:ea typeface="+mn-ea"/>
+          <a:cs typeface="+mn-cs"/>
+        </a:defRPr>
+      </a:lvl2pPr>
+      <a:lvl3pPr marL="1143000" indent="-228600" algn="l" defTabSz="914400" rtl="0" eaLnBrk="1" latinLnBrk="0" hangingPunct="1">
+        <a:lnSpc>
+          <a:spcPct val="90000"/>
+        </a:lnSpc>
+        <a:spcBef>
+          <a:spcPts val="500"/>
+        </a:spcBef>
+        <a:buFont typeface="Arial" panose="020B0604020202020204" pitchFamily="34" charset="0"/>
+        <a:buChar char="•"/>
         <a:defRPr sz="2000" kern="1200">
           <a:solidFill>
             <a:schemeClr val="tx1"/>
@@ -3706,25 +3118,16 @@
           <a:ea typeface="+mn-ea"/>
           <a:cs typeface="+mn-cs"/>
         </a:defRPr>
-      </a:lvl1pPr>
-      <a:lvl2pPr marL="457200" indent="-182880" algn="l" defTabSz="914400" rtl="0" eaLnBrk="1" latinLnBrk="0" hangingPunct="1">
+      </a:lvl3pPr>
+      <a:lvl4pPr marL="1600200" indent="-228600" algn="l" defTabSz="914400" rtl="0" eaLnBrk="1" latinLnBrk="0" hangingPunct="1">
         <a:lnSpc>
           <a:spcPct val="90000"/>
         </a:lnSpc>
         <a:spcBef>
-          <a:spcPts val="400"/>
+          <a:spcPts val="500"/>
         </a:spcBef>
-        <a:spcAft>
-          <a:spcPts val="200"/>
-        </a:spcAft>
-        <a:buClr>
-          <a:schemeClr val="accent1">
-            <a:lumMod val="75000"/>
-          </a:schemeClr>
-        </a:buClr>
-        <a:buSzPct val="85000"/>
-        <a:buFont typeface="Wingdings" pitchFamily="2" charset="2"/>
-        <a:buChar char="§"/>
+        <a:buFont typeface="Arial" panose="020B0604020202020204" pitchFamily="34" charset="0"/>
+        <a:buChar char="•"/>
         <a:defRPr sz="1800" kern="1200">
           <a:solidFill>
             <a:schemeClr val="tx1"/>
@@ -3733,80 +3136,17 @@
           <a:ea typeface="+mn-ea"/>
           <a:cs typeface="+mn-cs"/>
         </a:defRPr>
-      </a:lvl2pPr>
-      <a:lvl3pPr marL="731520" indent="-182880" algn="l" defTabSz="914400" rtl="0" eaLnBrk="1" latinLnBrk="0" hangingPunct="1">
+      </a:lvl4pPr>
+      <a:lvl5pPr marL="2057400" indent="-228600" algn="l" defTabSz="914400" rtl="0" eaLnBrk="1" latinLnBrk="0" hangingPunct="1">
         <a:lnSpc>
           <a:spcPct val="90000"/>
         </a:lnSpc>
         <a:spcBef>
-          <a:spcPts val="400"/>
+          <a:spcPts val="500"/>
         </a:spcBef>
-        <a:spcAft>
-          <a:spcPts val="200"/>
-        </a:spcAft>
-        <a:buClr>
-          <a:schemeClr val="accent1">
-            <a:lumMod val="75000"/>
-          </a:schemeClr>
-        </a:buClr>
-        <a:buSzPct val="85000"/>
-        <a:buFont typeface="Wingdings" pitchFamily="2" charset="2"/>
-        <a:buChar char="§"/>
-        <a:defRPr sz="1600" kern="1200">
-          <a:solidFill>
-            <a:schemeClr val="tx1"/>
-          </a:solidFill>
-          <a:latin typeface="+mn-lt"/>
-          <a:ea typeface="+mn-ea"/>
-          <a:cs typeface="+mn-cs"/>
-        </a:defRPr>
-      </a:lvl3pPr>
-      <a:lvl4pPr marL="1005840" indent="-182880" algn="l" defTabSz="914400" rtl="0" eaLnBrk="1" latinLnBrk="0" hangingPunct="1">
-        <a:lnSpc>
-          <a:spcPct val="90000"/>
-        </a:lnSpc>
-        <a:spcBef>
-          <a:spcPts val="400"/>
-        </a:spcBef>
-        <a:spcAft>
-          <a:spcPts val="200"/>
-        </a:spcAft>
-        <a:buClr>
-          <a:schemeClr val="accent1">
-            <a:lumMod val="75000"/>
-          </a:schemeClr>
-        </a:buClr>
-        <a:buSzPct val="85000"/>
-        <a:buFont typeface="Wingdings" pitchFamily="2" charset="2"/>
-        <a:buChar char="§"/>
-        <a:defRPr sz="1600" kern="1200">
-          <a:solidFill>
-            <a:schemeClr val="tx1"/>
-          </a:solidFill>
-          <a:latin typeface="+mn-lt"/>
-          <a:ea typeface="+mn-ea"/>
-          <a:cs typeface="+mn-cs"/>
-        </a:defRPr>
-      </a:lvl4pPr>
-      <a:lvl5pPr marL="1280160" indent="-182880" algn="l" defTabSz="914400" rtl="0" eaLnBrk="1" latinLnBrk="0" hangingPunct="1">
-        <a:lnSpc>
-          <a:spcPct val="90000"/>
-        </a:lnSpc>
-        <a:spcBef>
-          <a:spcPts val="400"/>
-        </a:spcBef>
-        <a:spcAft>
-          <a:spcPts val="200"/>
-        </a:spcAft>
-        <a:buClr>
-          <a:schemeClr val="accent1">
-            <a:lumMod val="75000"/>
-          </a:schemeClr>
-        </a:buClr>
-        <a:buSzPct val="85000"/>
-        <a:buFont typeface="Wingdings" pitchFamily="2" charset="2"/>
-        <a:buChar char="§"/>
-        <a:defRPr sz="1600" kern="1200">
+        <a:buFont typeface="Arial" panose="020B0604020202020204" pitchFamily="34" charset="0"/>
+        <a:buChar char="•"/>
+        <a:defRPr sz="1800" kern="1200">
           <a:solidFill>
             <a:schemeClr val="tx1"/>
           </a:solidFill>
@@ -3815,25 +3155,16 @@
           <a:cs typeface="+mn-cs"/>
         </a:defRPr>
       </a:lvl5pPr>
-      <a:lvl6pPr marL="1600000" indent="-228600" algn="l" defTabSz="914400" rtl="0" eaLnBrk="1" latinLnBrk="0" hangingPunct="1">
+      <a:lvl6pPr marL="2514600" indent="-228600" algn="l" defTabSz="914400" rtl="0" eaLnBrk="1" latinLnBrk="0" hangingPunct="1">
         <a:lnSpc>
           <a:spcPct val="90000"/>
         </a:lnSpc>
         <a:spcBef>
-          <a:spcPts val="400"/>
+          <a:spcPts val="500"/>
         </a:spcBef>
-        <a:spcAft>
-          <a:spcPts val="200"/>
-        </a:spcAft>
-        <a:buClr>
-          <a:schemeClr val="accent1">
-            <a:lumMod val="75000"/>
-          </a:schemeClr>
-        </a:buClr>
-        <a:buSzPct val="85000"/>
-        <a:buFont typeface="Wingdings" pitchFamily="2" charset="2"/>
-        <a:buChar char="§"/>
-        <a:defRPr sz="1600" kern="1200">
+        <a:buFont typeface="Arial" panose="020B0604020202020204" pitchFamily="34" charset="0"/>
+        <a:buChar char="•"/>
+        <a:defRPr sz="1800" kern="1200">
           <a:solidFill>
             <a:schemeClr val="tx1"/>
           </a:solidFill>
@@ -3842,25 +3173,16 @@
           <a:cs typeface="+mn-cs"/>
         </a:defRPr>
       </a:lvl6pPr>
-      <a:lvl7pPr marL="1900000" indent="-228600" algn="l" defTabSz="914400" rtl="0" eaLnBrk="1" latinLnBrk="0" hangingPunct="1">
+      <a:lvl7pPr marL="2971800" indent="-228600" algn="l" defTabSz="914400" rtl="0" eaLnBrk="1" latinLnBrk="0" hangingPunct="1">
         <a:lnSpc>
           <a:spcPct val="90000"/>
         </a:lnSpc>
         <a:spcBef>
-          <a:spcPts val="400"/>
+          <a:spcPts val="500"/>
         </a:spcBef>
-        <a:spcAft>
-          <a:spcPts val="200"/>
-        </a:spcAft>
-        <a:buClr>
-          <a:schemeClr val="accent1">
-            <a:lumMod val="75000"/>
-          </a:schemeClr>
-        </a:buClr>
-        <a:buSzPct val="85000"/>
-        <a:buFont typeface="Wingdings" pitchFamily="2" charset="2"/>
-        <a:buChar char="§"/>
-        <a:defRPr sz="1600" kern="1200">
+        <a:buFont typeface="Arial" panose="020B0604020202020204" pitchFamily="34" charset="0"/>
+        <a:buChar char="•"/>
+        <a:defRPr sz="1800" kern="1200">
           <a:solidFill>
             <a:schemeClr val="tx1"/>
           </a:solidFill>
@@ -3869,25 +3191,16 @@
           <a:cs typeface="+mn-cs"/>
         </a:defRPr>
       </a:lvl7pPr>
-      <a:lvl8pPr marL="2200000" indent="-228600" algn="l" defTabSz="914400" rtl="0" eaLnBrk="1" latinLnBrk="0" hangingPunct="1">
+      <a:lvl8pPr marL="3429000" indent="-228600" algn="l" defTabSz="914400" rtl="0" eaLnBrk="1" latinLnBrk="0" hangingPunct="1">
         <a:lnSpc>
           <a:spcPct val="90000"/>
         </a:lnSpc>
         <a:spcBef>
-          <a:spcPts val="400"/>
+          <a:spcPts val="500"/>
         </a:spcBef>
-        <a:spcAft>
-          <a:spcPts val="200"/>
-        </a:spcAft>
-        <a:buClr>
-          <a:schemeClr val="accent1">
-            <a:lumMod val="75000"/>
-          </a:schemeClr>
-        </a:buClr>
-        <a:buSzPct val="85000"/>
-        <a:buFont typeface="Wingdings" pitchFamily="2" charset="2"/>
-        <a:buChar char="§"/>
-        <a:defRPr sz="1600" kern="1200">
+        <a:buFont typeface="Arial" panose="020B0604020202020204" pitchFamily="34" charset="0"/>
+        <a:buChar char="•"/>
+        <a:defRPr sz="1800" kern="1200">
           <a:solidFill>
             <a:schemeClr val="tx1"/>
           </a:solidFill>
@@ -3896,25 +3209,16 @@
           <a:cs typeface="+mn-cs"/>
         </a:defRPr>
       </a:lvl8pPr>
-      <a:lvl9pPr marL="2500000" indent="-228600" algn="l" defTabSz="914400" rtl="0" eaLnBrk="1" latinLnBrk="0" hangingPunct="1">
+      <a:lvl9pPr marL="3886200" indent="-228600" algn="l" defTabSz="914400" rtl="0" eaLnBrk="1" latinLnBrk="0" hangingPunct="1">
         <a:lnSpc>
           <a:spcPct val="90000"/>
         </a:lnSpc>
         <a:spcBef>
-          <a:spcPts val="400"/>
+          <a:spcPts val="500"/>
         </a:spcBef>
-        <a:spcAft>
-          <a:spcPts val="200"/>
-        </a:spcAft>
-        <a:buClr>
-          <a:schemeClr val="accent1">
-            <a:lumMod val="75000"/>
-          </a:schemeClr>
-        </a:buClr>
-        <a:buSzPct val="85000"/>
-        <a:buFont typeface="Wingdings" pitchFamily="2" charset="2"/>
-        <a:buChar char="§"/>
-        <a:defRPr sz="1600" kern="1200">
+        <a:buFont typeface="Arial" panose="020B0604020202020204" pitchFamily="34" charset="0"/>
+        <a:buChar char="•"/>
+        <a:defRPr sz="1800" kern="1200">
           <a:solidFill>
             <a:schemeClr val="tx1"/>
           </a:solidFill>
@@ -6491,9 +5795,9 @@
 </file>
 
 <file path=ppt/theme/theme1.xml><?xml version="1.0" encoding="utf-8"?>
-<a:theme xmlns:a="http://schemas.openxmlformats.org/drawingml/2006/main" name="Wood Type">
+<a:theme xmlns:a="http://schemas.openxmlformats.org/drawingml/2006/main" name="Office Theme">
   <a:themeElements>
-    <a:clrScheme name="Wood Type">
+    <a:clrScheme name="Office">
       <a:dk1>
         <a:sysClr val="windowText" lastClr="000000"/>
       </a:dk1>
@@ -6501,86 +5805,48 @@
         <a:sysClr val="window" lastClr="FFFFFF"/>
       </a:lt1>
       <a:dk2>
-        <a:srgbClr val="696464"/>
+        <a:srgbClr val="44546A"/>
       </a:dk2>
       <a:lt2>
-        <a:srgbClr val="E9E5DC"/>
+        <a:srgbClr val="E7E6E6"/>
       </a:lt2>
       <a:accent1>
-        <a:srgbClr val="D34817"/>
+        <a:srgbClr val="4472C4"/>
       </a:accent1>
       <a:accent2>
-        <a:srgbClr val="9B2D1F"/>
+        <a:srgbClr val="ED7D31"/>
       </a:accent2>
       <a:accent3>
-        <a:srgbClr val="A28E6A"/>
+        <a:srgbClr val="A5A5A5"/>
       </a:accent3>
       <a:accent4>
-        <a:srgbClr val="956251"/>
+        <a:srgbClr val="FFC000"/>
       </a:accent4>
       <a:accent5>
-        <a:srgbClr val="918485"/>
+        <a:srgbClr val="5B9BD5"/>
       </a:accent5>
       <a:accent6>
-        <a:srgbClr val="855D5D"/>
+        <a:srgbClr val="70AD47"/>
       </a:accent6>
       <a:hlink>
-        <a:srgbClr val="CC9900"/>
+        <a:srgbClr val="0563C1"/>
       </a:hlink>
       <a:folHlink>
-        <a:srgbClr val="96A9A9"/>
+        <a:srgbClr val="954F72"/>
       </a:folHlink>
     </a:clrScheme>
-    <a:fontScheme name="Wood Type">
+    <a:fontScheme name="Office">
       <a:majorFont>
-        <a:latin typeface="Rockwell Condensed" panose="02060603050405020104"/>
+        <a:latin typeface="Calibri Light" panose="020F0302020204030204"/>
         <a:ea typeface=""/>
         <a:cs typeface=""/>
-        <a:font script="Grek" typeface="Cambria"/>
-        <a:font script="Cyrl" typeface="Cambria"/>
-        <a:font script="Jpan" typeface="HG明朝B"/>
-        <a:font script="Hang" typeface="바탕"/>
-        <a:font script="Hans" typeface="方正姚体"/>
-        <a:font script="Hant" typeface="微軟正黑體"/>
+        <a:font script="Jpan" typeface="游ゴシック Light"/>
+        <a:font script="Hang" typeface="맑은 고딕"/>
+        <a:font script="Hans" typeface="等线 Light"/>
+        <a:font script="Hant" typeface="新細明體"/>
         <a:font script="Arab" typeface="Times New Roman"/>
-        <a:font script="Hebr" typeface="David"/>
-        <a:font script="Thai" typeface="JasmineUPC"/>
-        <a:font script="Ethi" typeface="Nyala"/>
-        <a:font script="Beng" typeface="Vrinda"/>
-        <a:font script="Gujr" typeface="Shruti"/>
-        <a:font script="Khmr" typeface="MoolBoran"/>
-        <a:font script="Knda" typeface="Tunga"/>
-        <a:font script="Guru" typeface="Raavi"/>
-        <a:font script="Cans" typeface="Euphemia"/>
-        <a:font script="Cher" typeface="Plantagenet Cherokee"/>
-        <a:font script="Yiii" typeface="Microsoft Yi Baiti"/>
-        <a:font script="Tibt" typeface="Microsoft Himalaya"/>
-        <a:font script="Thaa" typeface="MV Boli"/>
-        <a:font script="Deva" typeface="Mangal"/>
-        <a:font script="Telu" typeface="Gautami"/>
-        <a:font script="Taml" typeface="Latha"/>
-        <a:font script="Syrc" typeface="Estrangelo Edessa"/>
-        <a:font script="Orya" typeface="Kalinga"/>
-        <a:font script="Mlym" typeface="Kartika"/>
-        <a:font script="Laoo" typeface="DokChampa"/>
-        <a:font script="Sinh" typeface="Iskoola Pota"/>
-        <a:font script="Mong" typeface="Mongolian Baiti"/>
-        <a:font script="Viet" typeface="Arial"/>
-        <a:font script="Uigh" typeface="Microsoft Uighur"/>
-      </a:majorFont>
-      <a:minorFont>
-        <a:latin typeface="Rockwell" panose="02060603020205020403"/>
-        <a:ea typeface=""/>
-        <a:cs typeface=""/>
-        <a:font script="Grek" typeface="Cambria"/>
-        <a:font script="Cyrl" typeface="Cambria"/>
-        <a:font script="Jpan" typeface="HG明朝B"/>
-        <a:font script="Hang" typeface="바탕"/>
-        <a:font script="Hans" typeface="方正姚体"/>
-        <a:font script="Hant" typeface="標楷體"/>
-        <a:font script="Arab" typeface="Times New Roman"/>
-        <a:font script="Hebr" typeface="David"/>
-        <a:font script="Thai" typeface="JasmineUPC"/>
+        <a:font script="Hebr" typeface="Times New Roman"/>
+        <a:font script="Thai" typeface="Angsana New"/>
         <a:font script="Ethi" typeface="Nyala"/>
         <a:font script="Beng" typeface="Vrinda"/>
         <a:font script="Gujr" typeface="Shruti"/>
@@ -6603,42 +5869,135 @@
         <a:font script="Mong" typeface="Mongolian Baiti"/>
         <a:font script="Viet" typeface="Times New Roman"/>
         <a:font script="Uigh" typeface="Microsoft Uighur"/>
+        <a:font script="Geor" typeface="Sylfaen"/>
+        <a:font script="Armn" typeface="Arial"/>
+        <a:font script="Bugi" typeface="Leelawadee UI"/>
+        <a:font script="Bopo" typeface="Microsoft JhengHei"/>
+        <a:font script="Java" typeface="Javanese Text"/>
+        <a:font script="Lisu" typeface="Segoe UI"/>
+        <a:font script="Mymr" typeface="Myanmar Text"/>
+        <a:font script="Nkoo" typeface="Ebrima"/>
+        <a:font script="Olck" typeface="Nirmala UI"/>
+        <a:font script="Osma" typeface="Ebrima"/>
+        <a:font script="Phag" typeface="Phagspa"/>
+        <a:font script="Syrn" typeface="Estrangelo Edessa"/>
+        <a:font script="Syrj" typeface="Estrangelo Edessa"/>
+        <a:font script="Syre" typeface="Estrangelo Edessa"/>
+        <a:font script="Sora" typeface="Nirmala UI"/>
+        <a:font script="Tale" typeface="Microsoft Tai Le"/>
+        <a:font script="Talu" typeface="Microsoft New Tai Lue"/>
+        <a:font script="Tfng" typeface="Ebrima"/>
+      </a:majorFont>
+      <a:minorFont>
+        <a:latin typeface="Calibri" panose="020F0502020204030204"/>
+        <a:ea typeface=""/>
+        <a:cs typeface=""/>
+        <a:font script="Jpan" typeface="游ゴシック"/>
+        <a:font script="Hang" typeface="맑은 고딕"/>
+        <a:font script="Hans" typeface="等线"/>
+        <a:font script="Hant" typeface="新細明體"/>
+        <a:font script="Arab" typeface="Arial"/>
+        <a:font script="Hebr" typeface="Arial"/>
+        <a:font script="Thai" typeface="Cordia New"/>
+        <a:font script="Ethi" typeface="Nyala"/>
+        <a:font script="Beng" typeface="Vrinda"/>
+        <a:font script="Gujr" typeface="Shruti"/>
+        <a:font script="Khmr" typeface="DaunPenh"/>
+        <a:font script="Knda" typeface="Tunga"/>
+        <a:font script="Guru" typeface="Raavi"/>
+        <a:font script="Cans" typeface="Euphemia"/>
+        <a:font script="Cher" typeface="Plantagenet Cherokee"/>
+        <a:font script="Yiii" typeface="Microsoft Yi Baiti"/>
+        <a:font script="Tibt" typeface="Microsoft Himalaya"/>
+        <a:font script="Thaa" typeface="MV Boli"/>
+        <a:font script="Deva" typeface="Mangal"/>
+        <a:font script="Telu" typeface="Gautami"/>
+        <a:font script="Taml" typeface="Latha"/>
+        <a:font script="Syrc" typeface="Estrangelo Edessa"/>
+        <a:font script="Orya" typeface="Kalinga"/>
+        <a:font script="Mlym" typeface="Kartika"/>
+        <a:font script="Laoo" typeface="DokChampa"/>
+        <a:font script="Sinh" typeface="Iskoola Pota"/>
+        <a:font script="Mong" typeface="Mongolian Baiti"/>
+        <a:font script="Viet" typeface="Arial"/>
+        <a:font script="Uigh" typeface="Microsoft Uighur"/>
+        <a:font script="Geor" typeface="Sylfaen"/>
+        <a:font script="Armn" typeface="Arial"/>
+        <a:font script="Bugi" typeface="Leelawadee UI"/>
+        <a:font script="Bopo" typeface="Microsoft JhengHei"/>
+        <a:font script="Java" typeface="Javanese Text"/>
+        <a:font script="Lisu" typeface="Segoe UI"/>
+        <a:font script="Mymr" typeface="Myanmar Text"/>
+        <a:font script="Nkoo" typeface="Ebrima"/>
+        <a:font script="Olck" typeface="Nirmala UI"/>
+        <a:font script="Osma" typeface="Ebrima"/>
+        <a:font script="Phag" typeface="Phagspa"/>
+        <a:font script="Syrn" typeface="Estrangelo Edessa"/>
+        <a:font script="Syrj" typeface="Estrangelo Edessa"/>
+        <a:font script="Syre" typeface="Estrangelo Edessa"/>
+        <a:font script="Sora" typeface="Nirmala UI"/>
+        <a:font script="Tale" typeface="Microsoft Tai Le"/>
+        <a:font script="Talu" typeface="Microsoft New Tai Lue"/>
+        <a:font script="Tfng" typeface="Ebrima"/>
       </a:minorFont>
     </a:fontScheme>
-    <a:fmtScheme name="Wood Type">
+    <a:fmtScheme name="Office">
       <a:fillStyleLst>
         <a:solidFill>
           <a:schemeClr val="phClr"/>
         </a:solidFill>
-        <a:blipFill rotWithShape="1">
-          <a:blip xmlns:r="http://schemas.openxmlformats.org/officeDocument/2006/relationships" r:embed="rId1">
-            <a:duotone>
+        <a:gradFill rotWithShape="1">
+          <a:gsLst>
+            <a:gs pos="0">
               <a:schemeClr val="phClr">
-                <a:tint val="70000"/>
-                <a:shade val="63000"/>
+                <a:lumMod val="110000"/>
+                <a:satMod val="105000"/>
+                <a:tint val="67000"/>
               </a:schemeClr>
+            </a:gs>
+            <a:gs pos="50000">
               <a:schemeClr val="phClr">
-                <a:tint val="10000"/>
-                <a:satMod val="150000"/>
+                <a:lumMod val="105000"/>
+                <a:satMod val="103000"/>
+                <a:tint val="73000"/>
               </a:schemeClr>
-            </a:duotone>
-          </a:blip>
-          <a:tile tx="0" ty="0" sx="60000" sy="59000" flip="none" algn="tl"/>
-        </a:blipFill>
-        <a:blipFill rotWithShape="1">
-          <a:blip xmlns:r="http://schemas.openxmlformats.org/officeDocument/2006/relationships" r:embed="rId1">
-            <a:duotone>
+            </a:gs>
+            <a:gs pos="100000">
               <a:schemeClr val="phClr">
-                <a:shade val="36000"/>
+                <a:lumMod val="105000"/>
+                <a:satMod val="109000"/>
+                <a:tint val="81000"/>
+              </a:schemeClr>
+            </a:gs>
+          </a:gsLst>
+          <a:lin ang="5400000" scaled="0"/>
+        </a:gradFill>
+        <a:gradFill rotWithShape="1">
+          <a:gsLst>
+            <a:gs pos="0">
+              <a:schemeClr val="phClr">
+                <a:satMod val="103000"/>
+                <a:lumMod val="102000"/>
+                <a:tint val="94000"/>
+              </a:schemeClr>
+            </a:gs>
+            <a:gs pos="50000">
+              <a:schemeClr val="phClr">
+                <a:satMod val="110000"/>
+                <a:lumMod val="100000"/>
+                <a:shade val="100000"/>
+              </a:schemeClr>
+            </a:gs>
+            <a:gs pos="100000">
+              <a:schemeClr val="phClr">
+                <a:lumMod val="99000"/>
                 <a:satMod val="120000"/>
+                <a:shade val="78000"/>
               </a:schemeClr>
-              <a:schemeClr val="phClr">
-                <a:tint val="40000"/>
-              </a:schemeClr>
-            </a:duotone>
-          </a:blip>
-          <a:tile tx="0" ty="0" sx="60000" sy="59000" flip="none" algn="tl"/>
-        </a:blipFill>
+            </a:gs>
+          </a:gsLst>
+          <a:lin ang="5400000" scaled="0"/>
+        </a:gradFill>
       </a:fillStyleLst>
       <a:lnStyleLst>
         <a:ln w="6350" cap="flat" cmpd="sng" algn="ctr">
@@ -6646,18 +6005,21 @@
             <a:schemeClr val="phClr"/>
           </a:solidFill>
           <a:prstDash val="solid"/>
+          <a:miter lim="800000"/>
         </a:ln>
         <a:ln w="12700" cap="flat" cmpd="sng" algn="ctr">
           <a:solidFill>
             <a:schemeClr val="phClr"/>
           </a:solidFill>
           <a:prstDash val="solid"/>
+          <a:miter lim="800000"/>
         </a:ln>
         <a:ln w="19050" cap="flat" cmpd="sng" algn="ctr">
           <a:solidFill>
             <a:schemeClr val="phClr"/>
           </a:solidFill>
           <a:prstDash val="solid"/>
+          <a:miter lim="800000"/>
         </a:ln>
       </a:lnStyleLst>
       <a:effectStyleLst>
@@ -6665,18 +6027,15 @@
           <a:effectLst/>
         </a:effectStyle>
         <a:effectStyle>
-          <a:effectLst>
-            <a:softEdge rad="12700"/>
-          </a:effectLst>
+          <a:effectLst/>
         </a:effectStyle>
         <a:effectStyle>
           <a:effectLst>
-            <a:outerShdw blurRad="50800" dist="19050" dir="5400000" algn="tl" rotWithShape="0">
+            <a:outerShdw blurRad="57150" dist="19050" dir="5400000" algn="ctr" rotWithShape="0">
               <a:srgbClr val="000000">
-                <a:alpha val="60000"/>
+                <a:alpha val="63000"/>
               </a:srgbClr>
             </a:outerShdw>
-            <a:softEdge rad="12700"/>
           </a:effectLst>
         </a:effectStyle>
       </a:effectStyleLst>
@@ -6686,26 +6045,37 @@
         </a:solidFill>
         <a:solidFill>
           <a:schemeClr val="phClr">
-            <a:shade val="97000"/>
-            <a:satMod val="150000"/>
+            <a:tint val="95000"/>
+            <a:satMod val="170000"/>
           </a:schemeClr>
         </a:solidFill>
-        <a:blipFill rotWithShape="1">
-          <a:blip xmlns:r="http://schemas.openxmlformats.org/officeDocument/2006/relationships" r:embed="rId1">
-            <a:duotone>
+        <a:gradFill rotWithShape="1">
+          <a:gsLst>
+            <a:gs pos="0">
               <a:schemeClr val="phClr">
-                <a:tint val="75000"/>
-                <a:shade val="58000"/>
+                <a:tint val="93000"/>
+                <a:satMod val="150000"/>
+                <a:shade val="98000"/>
+                <a:lumMod val="102000"/>
+              </a:schemeClr>
+            </a:gs>
+            <a:gs pos="50000">
+              <a:schemeClr val="phClr">
+                <a:tint val="98000"/>
+                <a:satMod val="130000"/>
+                <a:shade val="90000"/>
+                <a:lumMod val="103000"/>
+              </a:schemeClr>
+            </a:gs>
+            <a:gs pos="100000">
+              <a:schemeClr val="phClr">
+                <a:shade val="63000"/>
                 <a:satMod val="120000"/>
               </a:schemeClr>
-              <a:schemeClr val="phClr">
-                <a:tint val="50000"/>
-                <a:shade val="96000"/>
-              </a:schemeClr>
-            </a:duotone>
-          </a:blip>
-          <a:tile tx="0" ty="0" sx="100000" sy="100000" flip="none" algn="tl"/>
-        </a:blipFill>
+            </a:gs>
+          </a:gsLst>
+          <a:lin ang="5400000" scaled="0"/>
+        </a:gradFill>
       </a:bgFillStyleLst>
     </a:fmtScheme>
   </a:themeElements>
@@ -6713,7 +6083,7 @@
   <a:extraClrSchemeLst/>
   <a:extLst>
     <a:ext uri="{05A4C25C-085E-4340-85A3-A5531E510DB2}">
-      <thm15:themeFamily xmlns:thm15="http://schemas.microsoft.com/office/thememl/2012/main" name="Wood Type" id="{7ACABC62-BF99-48CF-A9DC-4DB89C7B13DC}" vid="{142A1326-48AB-42A9-8428-CB14AA30176D}"/>
+      <thm15:themeFamily xmlns:thm15="http://schemas.microsoft.com/office/thememl/2012/main" name="Office Theme" id="{62F939B6-93AF-4DB8-9C6B-D6C7DFDC589F}" vid="{4A3C46E8-61CC-4603-A589-7422A47A8E4A}"/>
     </a:ext>
   </a:extLst>
 </a:theme>

</xml_diff>